<commit_message>
A few many things
Some more clean up, changed a few functions' names, added our infamous setUnvisited functionality to every function, how the 'distanceBetweenNodes' function worked, wrote the documentation that was missing in the Graph.h file, implemented the sosACO function again and added the printPath function to the menu
</commit_message>
<xml_diff>
--- a/DA2.pptx
+++ b/DA2.pptx
@@ -177,7 +177,7 @@
           <a:noFill/>
           <a:extLst>
             <a:ext uri="{909E8E84-426E-40dd-AFC4-6F175D3DCCD1}">
-              <a14:hiddenFill xmlns:a14="http://schemas.microsoft.com/office/drawing/2010/main" xmlns="">
+              <a14:hiddenFill xmlns="" xmlns:a14="http://schemas.microsoft.com/office/drawing/2010/main">
                 <a:solidFill>
                   <a:srgbClr val="FFFFFF"/>
                 </a:solidFill>
@@ -236,7 +236,7 @@
             </a:ln>
             <a:extLst>
               <a:ext uri="{91240B29-F687-4f45-9708-019B960494DF}">
-                <a14:hiddenLine xmlns:a14="http://schemas.microsoft.com/office/drawing/2010/main" xmlns="" w="9525">
+                <a14:hiddenLine xmlns="" xmlns:a14="http://schemas.microsoft.com/office/drawing/2010/main" w="9525">
                   <a:solidFill>
                     <a:srgbClr val="000000"/>
                   </a:solidFill>
@@ -326,7 +326,7 @@
             </a:ln>
             <a:extLst>
               <a:ext uri="{91240B29-F687-4f45-9708-019B960494DF}">
-                <a14:hiddenLine xmlns:a14="http://schemas.microsoft.com/office/drawing/2010/main" xmlns="" w="9525">
+                <a14:hiddenLine xmlns="" xmlns:a14="http://schemas.microsoft.com/office/drawing/2010/main" w="9525">
                   <a:solidFill>
                     <a:srgbClr val="000000"/>
                   </a:solidFill>
@@ -416,7 +416,7 @@
             </a:ln>
             <a:extLst>
               <a:ext uri="{91240B29-F687-4f45-9708-019B960494DF}">
-                <a14:hiddenLine xmlns:a14="http://schemas.microsoft.com/office/drawing/2010/main" xmlns="" w="9525">
+                <a14:hiddenLine xmlns="" xmlns:a14="http://schemas.microsoft.com/office/drawing/2010/main" w="9525">
                   <a:solidFill>
                     <a:srgbClr val="000000"/>
                   </a:solidFill>
@@ -450,7 +450,7 @@
             </a:ln>
             <a:extLst>
               <a:ext uri="{91240B29-F687-4f45-9708-019B960494DF}">
-                <a14:hiddenLine xmlns:a14="http://schemas.microsoft.com/office/drawing/2010/main" xmlns="" w="9525">
+                <a14:hiddenLine xmlns="" xmlns:a14="http://schemas.microsoft.com/office/drawing/2010/main" w="9525">
                   <a:solidFill>
                     <a:srgbClr val="000000"/>
                   </a:solidFill>
@@ -540,7 +540,7 @@
             </a:ln>
             <a:extLst>
               <a:ext uri="{91240B29-F687-4f45-9708-019B960494DF}">
-                <a14:hiddenLine xmlns:a14="http://schemas.microsoft.com/office/drawing/2010/main" xmlns="" w="9525">
+                <a14:hiddenLine xmlns="" xmlns:a14="http://schemas.microsoft.com/office/drawing/2010/main" w="9525">
                   <a:solidFill>
                     <a:srgbClr val="000000"/>
                   </a:solidFill>
@@ -602,7 +602,7 @@
             </a:ln>
             <a:extLst>
               <a:ext uri="{91240B29-F687-4f45-9708-019B960494DF}">
-                <a14:hiddenLine xmlns:a14="http://schemas.microsoft.com/office/drawing/2010/main" xmlns="" w="9525">
+                <a14:hiddenLine xmlns="" xmlns:a14="http://schemas.microsoft.com/office/drawing/2010/main" w="9525">
                   <a:solidFill>
                     <a:srgbClr val="000000"/>
                   </a:solidFill>
@@ -664,7 +664,7 @@
             </a:ln>
             <a:extLst>
               <a:ext uri="{91240B29-F687-4f45-9708-019B960494DF}">
-                <a14:hiddenLine xmlns:a14="http://schemas.microsoft.com/office/drawing/2010/main" xmlns="" w="9525">
+                <a14:hiddenLine xmlns="" xmlns:a14="http://schemas.microsoft.com/office/drawing/2010/main" w="9525">
                   <a:solidFill>
                     <a:srgbClr val="000000"/>
                   </a:solidFill>
@@ -754,7 +754,7 @@
             </a:ln>
             <a:extLst>
               <a:ext uri="{91240B29-F687-4f45-9708-019B960494DF}">
-                <a14:hiddenLine xmlns:a14="http://schemas.microsoft.com/office/drawing/2010/main" xmlns="" w="9525">
+                <a14:hiddenLine xmlns="" xmlns:a14="http://schemas.microsoft.com/office/drawing/2010/main" w="9525">
                   <a:solidFill>
                     <a:srgbClr val="000000"/>
                   </a:solidFill>
@@ -816,7 +816,7 @@
             </a:ln>
             <a:extLst>
               <a:ext uri="{91240B29-F687-4f45-9708-019B960494DF}">
-                <a14:hiddenLine xmlns:a14="http://schemas.microsoft.com/office/drawing/2010/main" xmlns="" w="9525">
+                <a14:hiddenLine xmlns="" xmlns:a14="http://schemas.microsoft.com/office/drawing/2010/main" w="9525">
                   <a:solidFill>
                     <a:srgbClr val="000000"/>
                   </a:solidFill>
@@ -878,7 +878,7 @@
             </a:ln>
             <a:extLst>
               <a:ext uri="{91240B29-F687-4f45-9708-019B960494DF}">
-                <a14:hiddenLine xmlns:a14="http://schemas.microsoft.com/office/drawing/2010/main" xmlns="" w="9525">
+                <a14:hiddenLine xmlns="" xmlns:a14="http://schemas.microsoft.com/office/drawing/2010/main" w="9525">
                   <a:solidFill>
                     <a:srgbClr val="000000"/>
                   </a:solidFill>
@@ -968,7 +968,7 @@
             </a:ln>
             <a:extLst>
               <a:ext uri="{91240B29-F687-4f45-9708-019B960494DF}">
-                <a14:hiddenLine xmlns:a14="http://schemas.microsoft.com/office/drawing/2010/main" xmlns="" w="9525">
+                <a14:hiddenLine xmlns="" xmlns:a14="http://schemas.microsoft.com/office/drawing/2010/main" w="9525">
                   <a:solidFill>
                     <a:srgbClr val="000000"/>
                   </a:solidFill>
@@ -1058,7 +1058,7 @@
             </a:ln>
             <a:extLst>
               <a:ext uri="{91240B29-F687-4f45-9708-019B960494DF}">
-                <a14:hiddenLine xmlns:a14="http://schemas.microsoft.com/office/drawing/2010/main" xmlns="" w="9525">
+                <a14:hiddenLine xmlns="" xmlns:a14="http://schemas.microsoft.com/office/drawing/2010/main" w="9525">
                   <a:solidFill>
                     <a:srgbClr val="000000"/>
                   </a:solidFill>
@@ -1120,7 +1120,7 @@
             </a:ln>
             <a:extLst>
               <a:ext uri="{91240B29-F687-4f45-9708-019B960494DF}">
-                <a14:hiddenLine xmlns:a14="http://schemas.microsoft.com/office/drawing/2010/main" xmlns="" w="9525">
+                <a14:hiddenLine xmlns="" xmlns:a14="http://schemas.microsoft.com/office/drawing/2010/main" w="9525">
                   <a:solidFill>
                     <a:srgbClr val="000000"/>
                   </a:solidFill>
@@ -1230,7 +1230,7 @@
             </a:ln>
             <a:extLst>
               <a:ext uri="{91240B29-F687-4f45-9708-019B960494DF}">
-                <a14:hiddenLine xmlns:a14="http://schemas.microsoft.com/office/drawing/2010/main" xmlns="" w="9525">
+                <a14:hiddenLine xmlns="" xmlns:a14="http://schemas.microsoft.com/office/drawing/2010/main" w="9525">
                   <a:solidFill>
                     <a:srgbClr val="000000"/>
                   </a:solidFill>
@@ -1292,7 +1292,7 @@
             </a:ln>
             <a:extLst>
               <a:ext uri="{91240B29-F687-4f45-9708-019B960494DF}">
-                <a14:hiddenLine xmlns:a14="http://schemas.microsoft.com/office/drawing/2010/main" xmlns="" w="9525">
+                <a14:hiddenLine xmlns="" xmlns:a14="http://schemas.microsoft.com/office/drawing/2010/main" w="9525">
                   <a:solidFill>
                     <a:srgbClr val="000000"/>
                   </a:solidFill>
@@ -1382,7 +1382,7 @@
             </a:ln>
             <a:extLst>
               <a:ext uri="{91240B29-F687-4f45-9708-019B960494DF}">
-                <a14:hiddenLine xmlns:a14="http://schemas.microsoft.com/office/drawing/2010/main" xmlns="" w="9525">
+                <a14:hiddenLine xmlns="" xmlns:a14="http://schemas.microsoft.com/office/drawing/2010/main" w="9525">
                   <a:solidFill>
                     <a:srgbClr val="000000"/>
                   </a:solidFill>
@@ -1472,7 +1472,7 @@
             </a:ln>
             <a:extLst>
               <a:ext uri="{91240B29-F687-4f45-9708-019B960494DF}">
-                <a14:hiddenLine xmlns:a14="http://schemas.microsoft.com/office/drawing/2010/main" xmlns="" w="9525">
+                <a14:hiddenLine xmlns="" xmlns:a14="http://schemas.microsoft.com/office/drawing/2010/main" w="9525">
                   <a:solidFill>
                     <a:srgbClr val="000000"/>
                   </a:solidFill>
@@ -1534,7 +1534,7 @@
             </a:ln>
             <a:extLst>
               <a:ext uri="{91240B29-F687-4f45-9708-019B960494DF}">
-                <a14:hiddenLine xmlns:a14="http://schemas.microsoft.com/office/drawing/2010/main" xmlns="" w="9525">
+                <a14:hiddenLine xmlns="" xmlns:a14="http://schemas.microsoft.com/office/drawing/2010/main" w="9525">
                   <a:solidFill>
                     <a:srgbClr val="000000"/>
                   </a:solidFill>
@@ -1624,7 +1624,7 @@
             </a:ln>
             <a:extLst>
               <a:ext uri="{91240B29-F687-4f45-9708-019B960494DF}">
-                <a14:hiddenLine xmlns:a14="http://schemas.microsoft.com/office/drawing/2010/main" xmlns="" w="9525">
+                <a14:hiddenLine xmlns="" xmlns:a14="http://schemas.microsoft.com/office/drawing/2010/main" w="9525">
                   <a:solidFill>
                     <a:srgbClr val="000000"/>
                   </a:solidFill>
@@ -1714,7 +1714,7 @@
             </a:ln>
             <a:extLst>
               <a:ext uri="{91240B29-F687-4f45-9708-019B960494DF}">
-                <a14:hiddenLine xmlns:a14="http://schemas.microsoft.com/office/drawing/2010/main" xmlns="" w="9525">
+                <a14:hiddenLine xmlns="" xmlns:a14="http://schemas.microsoft.com/office/drawing/2010/main" w="9525">
                   <a:solidFill>
                     <a:srgbClr val="000000"/>
                   </a:solidFill>
@@ -1770,7 +1770,7 @@
             </a:ln>
             <a:extLst>
               <a:ext uri="{91240B29-F687-4f45-9708-019B960494DF}">
-                <a14:hiddenLine xmlns:a14="http://schemas.microsoft.com/office/drawing/2010/main" xmlns="" w="9525">
+                <a14:hiddenLine xmlns="" xmlns:a14="http://schemas.microsoft.com/office/drawing/2010/main" w="9525">
                   <a:solidFill>
                     <a:srgbClr val="000000"/>
                   </a:solidFill>
@@ -1860,7 +1860,7 @@
             </a:ln>
             <a:extLst>
               <a:ext uri="{91240B29-F687-4f45-9708-019B960494DF}">
-                <a14:hiddenLine xmlns:a14="http://schemas.microsoft.com/office/drawing/2010/main" xmlns="" w="9525">
+                <a14:hiddenLine xmlns="" xmlns:a14="http://schemas.microsoft.com/office/drawing/2010/main" w="9525">
                   <a:solidFill>
                     <a:srgbClr val="000000"/>
                   </a:solidFill>
@@ -1916,7 +1916,7 @@
             </a:ln>
             <a:extLst>
               <a:ext uri="{91240B29-F687-4f45-9708-019B960494DF}">
-                <a14:hiddenLine xmlns:a14="http://schemas.microsoft.com/office/drawing/2010/main" xmlns="" w="9525">
+                <a14:hiddenLine xmlns="" xmlns:a14="http://schemas.microsoft.com/office/drawing/2010/main" w="9525">
                   <a:solidFill>
                     <a:srgbClr val="000000"/>
                   </a:solidFill>
@@ -2006,7 +2006,7 @@
             </a:ln>
             <a:extLst>
               <a:ext uri="{91240B29-F687-4f45-9708-019B960494DF}">
-                <a14:hiddenLine xmlns:a14="http://schemas.microsoft.com/office/drawing/2010/main" xmlns="" w="9525">
+                <a14:hiddenLine xmlns="" xmlns:a14="http://schemas.microsoft.com/office/drawing/2010/main" w="9525">
                   <a:solidFill>
                     <a:srgbClr val="000000"/>
                   </a:solidFill>
@@ -2074,7 +2074,7 @@
             </a:ln>
             <a:extLst>
               <a:ext uri="{91240B29-F687-4f45-9708-019B960494DF}">
-                <a14:hiddenLine xmlns:a14="http://schemas.microsoft.com/office/drawing/2010/main" xmlns="" w="9525">
+                <a14:hiddenLine xmlns="" xmlns:a14="http://schemas.microsoft.com/office/drawing/2010/main" w="9525">
                   <a:solidFill>
                     <a:srgbClr val="000000"/>
                   </a:solidFill>
@@ -2164,7 +2164,7 @@
             </a:ln>
             <a:extLst>
               <a:ext uri="{91240B29-F687-4f45-9708-019B960494DF}">
-                <a14:hiddenLine xmlns:a14="http://schemas.microsoft.com/office/drawing/2010/main" xmlns="" w="9525">
+                <a14:hiddenLine xmlns="" xmlns:a14="http://schemas.microsoft.com/office/drawing/2010/main" w="9525">
                   <a:solidFill>
                     <a:srgbClr val="000000"/>
                   </a:solidFill>
@@ -2232,7 +2232,7 @@
             </a:ln>
             <a:extLst>
               <a:ext uri="{91240B29-F687-4f45-9708-019B960494DF}">
-                <a14:hiddenLine xmlns:a14="http://schemas.microsoft.com/office/drawing/2010/main" xmlns="" w="9525">
+                <a14:hiddenLine xmlns="" xmlns:a14="http://schemas.microsoft.com/office/drawing/2010/main" w="9525">
                   <a:solidFill>
                     <a:srgbClr val="000000"/>
                   </a:solidFill>
@@ -2322,7 +2322,7 @@
             </a:ln>
             <a:extLst>
               <a:ext uri="{91240B29-F687-4f45-9708-019B960494DF}">
-                <a14:hiddenLine xmlns:a14="http://schemas.microsoft.com/office/drawing/2010/main" xmlns="" w="9525">
+                <a14:hiddenLine xmlns="" xmlns:a14="http://schemas.microsoft.com/office/drawing/2010/main" w="9525">
                   <a:solidFill>
                     <a:srgbClr val="000000"/>
                   </a:solidFill>
@@ -2356,7 +2356,7 @@
             </a:ln>
             <a:extLst>
               <a:ext uri="{91240B29-F687-4f45-9708-019B960494DF}">
-                <a14:hiddenLine xmlns:a14="http://schemas.microsoft.com/office/drawing/2010/main" xmlns="" w="9525">
+                <a14:hiddenLine xmlns="" xmlns:a14="http://schemas.microsoft.com/office/drawing/2010/main" w="9525">
                   <a:solidFill>
                     <a:srgbClr val="000000"/>
                   </a:solidFill>
@@ -2446,7 +2446,7 @@
             </a:ln>
             <a:extLst>
               <a:ext uri="{91240B29-F687-4f45-9708-019B960494DF}">
-                <a14:hiddenLine xmlns:a14="http://schemas.microsoft.com/office/drawing/2010/main" xmlns="" w="9525">
+                <a14:hiddenLine xmlns="" xmlns:a14="http://schemas.microsoft.com/office/drawing/2010/main" w="9525">
                   <a:solidFill>
                     <a:srgbClr val="000000"/>
                   </a:solidFill>
@@ -2508,7 +2508,7 @@
             </a:ln>
             <a:extLst>
               <a:ext uri="{91240B29-F687-4f45-9708-019B960494DF}">
-                <a14:hiddenLine xmlns:a14="http://schemas.microsoft.com/office/drawing/2010/main" xmlns="" w="9525">
+                <a14:hiddenLine xmlns="" xmlns:a14="http://schemas.microsoft.com/office/drawing/2010/main" w="9525">
                   <a:solidFill>
                     <a:srgbClr val="000000"/>
                   </a:solidFill>
@@ -2570,7 +2570,7 @@
             </a:ln>
             <a:extLst>
               <a:ext uri="{91240B29-F687-4f45-9708-019B960494DF}">
-                <a14:hiddenLine xmlns:a14="http://schemas.microsoft.com/office/drawing/2010/main" xmlns="" w="9525">
+                <a14:hiddenLine xmlns="" xmlns:a14="http://schemas.microsoft.com/office/drawing/2010/main" w="9525">
                   <a:solidFill>
                     <a:srgbClr val="000000"/>
                   </a:solidFill>
@@ -2660,7 +2660,7 @@
             </a:ln>
             <a:extLst>
               <a:ext uri="{91240B29-F687-4f45-9708-019B960494DF}">
-                <a14:hiddenLine xmlns:a14="http://schemas.microsoft.com/office/drawing/2010/main" xmlns="" w="9525">
+                <a14:hiddenLine xmlns="" xmlns:a14="http://schemas.microsoft.com/office/drawing/2010/main" w="9525">
                   <a:solidFill>
                     <a:srgbClr val="000000"/>
                   </a:solidFill>
@@ -2728,7 +2728,7 @@
             </a:ln>
             <a:extLst>
               <a:ext uri="{91240B29-F687-4f45-9708-019B960494DF}">
-                <a14:hiddenLine xmlns:a14="http://schemas.microsoft.com/office/drawing/2010/main" xmlns="" w="9525">
+                <a14:hiddenLine xmlns="" xmlns:a14="http://schemas.microsoft.com/office/drawing/2010/main" w="9525">
                   <a:solidFill>
                     <a:srgbClr val="000000"/>
                   </a:solidFill>
@@ -2790,7 +2790,7 @@
             </a:ln>
             <a:extLst>
               <a:ext uri="{91240B29-F687-4f45-9708-019B960494DF}">
-                <a14:hiddenLine xmlns:a14="http://schemas.microsoft.com/office/drawing/2010/main" xmlns="" w="9525">
+                <a14:hiddenLine xmlns="" xmlns:a14="http://schemas.microsoft.com/office/drawing/2010/main" w="9525">
                   <a:solidFill>
                     <a:srgbClr val="000000"/>
                   </a:solidFill>
@@ -2880,7 +2880,7 @@
             </a:ln>
             <a:extLst>
               <a:ext uri="{91240B29-F687-4f45-9708-019B960494DF}">
-                <a14:hiddenLine xmlns:a14="http://schemas.microsoft.com/office/drawing/2010/main" xmlns="" w="9525">
+                <a14:hiddenLine xmlns="" xmlns:a14="http://schemas.microsoft.com/office/drawing/2010/main" w="9525">
                   <a:solidFill>
                     <a:srgbClr val="000000"/>
                   </a:solidFill>
@@ -2942,7 +2942,7 @@
             </a:ln>
             <a:extLst>
               <a:ext uri="{91240B29-F687-4f45-9708-019B960494DF}">
-                <a14:hiddenLine xmlns:a14="http://schemas.microsoft.com/office/drawing/2010/main" xmlns="" w="9525">
+                <a14:hiddenLine xmlns="" xmlns:a14="http://schemas.microsoft.com/office/drawing/2010/main" w="9525">
                   <a:solidFill>
                     <a:srgbClr val="000000"/>
                   </a:solidFill>
@@ -3032,7 +3032,7 @@
             </a:ln>
             <a:extLst>
               <a:ext uri="{91240B29-F687-4f45-9708-019B960494DF}">
-                <a14:hiddenLine xmlns:a14="http://schemas.microsoft.com/office/drawing/2010/main" xmlns="" w="9525">
+                <a14:hiddenLine xmlns="" xmlns:a14="http://schemas.microsoft.com/office/drawing/2010/main" w="9525">
                   <a:solidFill>
                     <a:srgbClr val="000000"/>
                   </a:solidFill>
@@ -3094,7 +3094,7 @@
             </a:ln>
             <a:extLst>
               <a:ext uri="{91240B29-F687-4f45-9708-019B960494DF}">
-                <a14:hiddenLine xmlns:a14="http://schemas.microsoft.com/office/drawing/2010/main" xmlns="" w="9525">
+                <a14:hiddenLine xmlns="" xmlns:a14="http://schemas.microsoft.com/office/drawing/2010/main" w="9525">
                   <a:solidFill>
                     <a:srgbClr val="000000"/>
                   </a:solidFill>
@@ -3184,7 +3184,7 @@
             </a:ln>
             <a:extLst>
               <a:ext uri="{91240B29-F687-4f45-9708-019B960494DF}">
-                <a14:hiddenLine xmlns:a14="http://schemas.microsoft.com/office/drawing/2010/main" xmlns="" w="9525">
+                <a14:hiddenLine xmlns="" xmlns:a14="http://schemas.microsoft.com/office/drawing/2010/main" w="9525">
                   <a:solidFill>
                     <a:srgbClr val="000000"/>
                   </a:solidFill>
@@ -3218,7 +3218,7 @@
             </a:ln>
             <a:extLst>
               <a:ext uri="{91240B29-F687-4f45-9708-019B960494DF}">
-                <a14:hiddenLine xmlns:a14="http://schemas.microsoft.com/office/drawing/2010/main" xmlns="" w="9525">
+                <a14:hiddenLine xmlns="" xmlns:a14="http://schemas.microsoft.com/office/drawing/2010/main" w="9525">
                   <a:solidFill>
                     <a:srgbClr val="000000"/>
                   </a:solidFill>
@@ -3283,7 +3283,7 @@
             </a:ln>
             <a:extLst>
               <a:ext uri="{91240B29-F687-4f45-9708-019B960494DF}">
-                <a14:hiddenLine xmlns:a14="http://schemas.microsoft.com/office/drawing/2010/main" xmlns="" w="9525">
+                <a14:hiddenLine xmlns="" xmlns:a14="http://schemas.microsoft.com/office/drawing/2010/main" w="9525">
                   <a:solidFill>
                     <a:srgbClr val="000000"/>
                   </a:solidFill>
@@ -3373,7 +3373,7 @@
             </a:ln>
             <a:extLst>
               <a:ext uri="{91240B29-F687-4f45-9708-019B960494DF}">
-                <a14:hiddenLine xmlns:a14="http://schemas.microsoft.com/office/drawing/2010/main" xmlns="" w="9525">
+                <a14:hiddenLine xmlns="" xmlns:a14="http://schemas.microsoft.com/office/drawing/2010/main" w="9525">
                   <a:solidFill>
                     <a:srgbClr val="000000"/>
                   </a:solidFill>
@@ -3435,7 +3435,7 @@
             </a:ln>
             <a:extLst>
               <a:ext uri="{91240B29-F687-4f45-9708-019B960494DF}">
-                <a14:hiddenLine xmlns:a14="http://schemas.microsoft.com/office/drawing/2010/main" xmlns="" w="9525">
+                <a14:hiddenLine xmlns="" xmlns:a14="http://schemas.microsoft.com/office/drawing/2010/main" w="9525">
                   <a:solidFill>
                     <a:srgbClr val="000000"/>
                   </a:solidFill>
@@ -3525,7 +3525,7 @@
             </a:ln>
             <a:extLst>
               <a:ext uri="{91240B29-F687-4f45-9708-019B960494DF}">
-                <a14:hiddenLine xmlns:a14="http://schemas.microsoft.com/office/drawing/2010/main" xmlns="" w="9525">
+                <a14:hiddenLine xmlns="" xmlns:a14="http://schemas.microsoft.com/office/drawing/2010/main" w="9525">
                   <a:solidFill>
                     <a:srgbClr val="000000"/>
                   </a:solidFill>
@@ -3615,7 +3615,7 @@
             </a:ln>
             <a:extLst>
               <a:ext uri="{91240B29-F687-4f45-9708-019B960494DF}">
-                <a14:hiddenLine xmlns:a14="http://schemas.microsoft.com/office/drawing/2010/main" xmlns="" w="9525">
+                <a14:hiddenLine xmlns="" xmlns:a14="http://schemas.microsoft.com/office/drawing/2010/main" w="9525">
                   <a:solidFill>
                     <a:srgbClr val="000000"/>
                   </a:solidFill>
@@ -3680,7 +3680,7 @@
             </a:ln>
             <a:extLst>
               <a:ext uri="{91240B29-F687-4f45-9708-019B960494DF}">
-                <a14:hiddenLine xmlns:a14="http://schemas.microsoft.com/office/drawing/2010/main" xmlns="" w="9525">
+                <a14:hiddenLine xmlns="" xmlns:a14="http://schemas.microsoft.com/office/drawing/2010/main" w="9525">
                   <a:solidFill>
                     <a:srgbClr val="000000"/>
                   </a:solidFill>
@@ -3742,7 +3742,7 @@
             </a:ln>
             <a:extLst>
               <a:ext uri="{91240B29-F687-4f45-9708-019B960494DF}">
-                <a14:hiddenLine xmlns:a14="http://schemas.microsoft.com/office/drawing/2010/main" xmlns="" w="9525">
+                <a14:hiddenLine xmlns="" xmlns:a14="http://schemas.microsoft.com/office/drawing/2010/main" w="9525">
                   <a:solidFill>
                     <a:srgbClr val="000000"/>
                   </a:solidFill>
@@ -3832,7 +3832,7 @@
             </a:ln>
             <a:extLst>
               <a:ext uri="{91240B29-F687-4f45-9708-019B960494DF}">
-                <a14:hiddenLine xmlns:a14="http://schemas.microsoft.com/office/drawing/2010/main" xmlns="" w="9525">
+                <a14:hiddenLine xmlns="" xmlns:a14="http://schemas.microsoft.com/office/drawing/2010/main" w="9525">
                   <a:solidFill>
                     <a:srgbClr val="000000"/>
                   </a:solidFill>
@@ -3922,7 +3922,7 @@
             </a:ln>
             <a:extLst>
               <a:ext uri="{91240B29-F687-4f45-9708-019B960494DF}">
-                <a14:hiddenLine xmlns:a14="http://schemas.microsoft.com/office/drawing/2010/main" xmlns="" w="9525">
+                <a14:hiddenLine xmlns="" xmlns:a14="http://schemas.microsoft.com/office/drawing/2010/main" w="9525">
                   <a:solidFill>
                     <a:srgbClr val="000000"/>
                   </a:solidFill>
@@ -3984,7 +3984,7 @@
             </a:ln>
             <a:extLst>
               <a:ext uri="{91240B29-F687-4f45-9708-019B960494DF}">
-                <a14:hiddenLine xmlns:a14="http://schemas.microsoft.com/office/drawing/2010/main" xmlns="" w="9525">
+                <a14:hiddenLine xmlns="" xmlns:a14="http://schemas.microsoft.com/office/drawing/2010/main" w="9525">
                   <a:solidFill>
                     <a:srgbClr val="000000"/>
                   </a:solidFill>
@@ -4104,7 +4104,7 @@
             </a:ln>
             <a:extLst>
               <a:ext uri="{91240B29-F687-4f45-9708-019B960494DF}">
-                <a14:hiddenLine xmlns:a14="http://schemas.microsoft.com/office/drawing/2010/main" xmlns="" w="9525">
+                <a14:hiddenLine xmlns="" xmlns:a14="http://schemas.microsoft.com/office/drawing/2010/main" w="9525">
                   <a:solidFill>
                     <a:srgbClr val="000000"/>
                   </a:solidFill>
@@ -4172,7 +4172,7 @@
             </a:ln>
             <a:extLst>
               <a:ext uri="{91240B29-F687-4f45-9708-019B960494DF}">
-                <a14:hiddenLine xmlns:a14="http://schemas.microsoft.com/office/drawing/2010/main" xmlns="" w="9525">
+                <a14:hiddenLine xmlns="" xmlns:a14="http://schemas.microsoft.com/office/drawing/2010/main" w="9525">
                   <a:solidFill>
                     <a:srgbClr val="000000"/>
                   </a:solidFill>
@@ -4262,7 +4262,7 @@
             </a:ln>
             <a:extLst>
               <a:ext uri="{91240B29-F687-4f45-9708-019B960494DF}">
-                <a14:hiddenLine xmlns:a14="http://schemas.microsoft.com/office/drawing/2010/main" xmlns="" w="9525">
+                <a14:hiddenLine xmlns="" xmlns:a14="http://schemas.microsoft.com/office/drawing/2010/main" w="9525">
                   <a:solidFill>
                     <a:srgbClr val="000000"/>
                   </a:solidFill>
@@ -4402,7 +4402,7 @@
           <a:p>
             <a:fld id="{48A87A34-81AB-432B-8DAE-1953F412C126}" type="datetimeFigureOut">
               <a:rPr lang="en-US" dirty="0"/>
-              <a:t>6/1/2023</a:t>
+              <a:t>6/2/2023</a:t>
             </a:fld>
             <a:endParaRPr lang="en-US" dirty="0"/>
           </a:p>
@@ -4664,7 +4664,7 @@
           <a:p>
             <a:fld id="{48A87A34-81AB-432B-8DAE-1953F412C126}" type="datetimeFigureOut">
               <a:rPr lang="en-US" dirty="0"/>
-              <a:t>6/1/2023</a:t>
+              <a:t>6/2/2023</a:t>
             </a:fld>
             <a:endParaRPr lang="en-US" dirty="0"/>
           </a:p>
@@ -4855,7 +4855,7 @@
           <a:p>
             <a:fld id="{48A87A34-81AB-432B-8DAE-1953F412C126}" type="datetimeFigureOut">
               <a:rPr lang="en-US" dirty="0"/>
-              <a:t>6/1/2023</a:t>
+              <a:t>6/2/2023</a:t>
             </a:fld>
             <a:endParaRPr lang="en-US" dirty="0"/>
           </a:p>
@@ -5113,7 +5113,7 @@
           <a:p>
             <a:fld id="{48A87A34-81AB-432B-8DAE-1953F412C126}" type="datetimeFigureOut">
               <a:rPr lang="en-US" dirty="0"/>
-              <a:t>6/1/2023</a:t>
+              <a:t>6/2/2023</a:t>
             </a:fld>
             <a:endParaRPr lang="en-US" dirty="0"/>
           </a:p>
@@ -5542,7 +5542,7 @@
           <a:p>
             <a:fld id="{48A87A34-81AB-432B-8DAE-1953F412C126}" type="datetimeFigureOut">
               <a:rPr lang="en-US" dirty="0"/>
-              <a:t>6/1/2023</a:t>
+              <a:t>6/2/2023</a:t>
             </a:fld>
             <a:endParaRPr lang="en-US" dirty="0"/>
           </a:p>
@@ -6083,7 +6083,7 @@
           <a:p>
             <a:fld id="{48A87A34-81AB-432B-8DAE-1953F412C126}" type="datetimeFigureOut">
               <a:rPr lang="en-US" dirty="0"/>
-              <a:t>6/1/2023</a:t>
+              <a:t>6/2/2023</a:t>
             </a:fld>
             <a:endParaRPr lang="en-US" dirty="0"/>
           </a:p>
@@ -6798,7 +6798,7 @@
           <a:p>
             <a:fld id="{48A87A34-81AB-432B-8DAE-1953F412C126}" type="datetimeFigureOut">
               <a:rPr lang="en-US" dirty="0"/>
-              <a:t>6/1/2023</a:t>
+              <a:t>6/2/2023</a:t>
             </a:fld>
             <a:endParaRPr lang="en-US" dirty="0"/>
           </a:p>
@@ -6963,7 +6963,7 @@
           <a:p>
             <a:fld id="{48A87A34-81AB-432B-8DAE-1953F412C126}" type="datetimeFigureOut">
               <a:rPr lang="en-US" dirty="0"/>
-              <a:t>6/1/2023</a:t>
+              <a:t>6/2/2023</a:t>
             </a:fld>
             <a:endParaRPr lang="en-US" dirty="0"/>
           </a:p>
@@ -7138,7 +7138,7 @@
           <a:p>
             <a:fld id="{48A87A34-81AB-432B-8DAE-1953F412C126}" type="datetimeFigureOut">
               <a:rPr lang="en-US" dirty="0"/>
-              <a:t>6/1/2023</a:t>
+              <a:t>6/2/2023</a:t>
             </a:fld>
             <a:endParaRPr lang="en-US" dirty="0"/>
           </a:p>
@@ -7303,7 +7303,7 @@
           <a:p>
             <a:fld id="{48A87A34-81AB-432B-8DAE-1953F412C126}" type="datetimeFigureOut">
               <a:rPr lang="en-US" dirty="0"/>
-              <a:t>6/1/2023</a:t>
+              <a:t>6/2/2023</a:t>
             </a:fld>
             <a:endParaRPr lang="en-US" dirty="0"/>
           </a:p>
@@ -7548,7 +7548,7 @@
           <a:p>
             <a:fld id="{48A87A34-81AB-432B-8DAE-1953F412C126}" type="datetimeFigureOut">
               <a:rPr lang="en-US" dirty="0"/>
-              <a:t>6/1/2023</a:t>
+              <a:t>6/2/2023</a:t>
             </a:fld>
             <a:endParaRPr lang="en-US" dirty="0"/>
           </a:p>
@@ -7775,7 +7775,7 @@
           <a:p>
             <a:fld id="{48A87A34-81AB-432B-8DAE-1953F412C126}" type="datetimeFigureOut">
               <a:rPr lang="en-US" dirty="0"/>
-              <a:t>6/1/2023</a:t>
+              <a:t>6/2/2023</a:t>
             </a:fld>
             <a:endParaRPr lang="en-US" dirty="0"/>
           </a:p>
@@ -8151,7 +8151,7 @@
           <a:p>
             <a:fld id="{48A87A34-81AB-432B-8DAE-1953F412C126}" type="datetimeFigureOut">
               <a:rPr lang="en-US" dirty="0"/>
-              <a:t>6/1/2023</a:t>
+              <a:t>6/2/2023</a:t>
             </a:fld>
             <a:endParaRPr lang="en-US" dirty="0"/>
           </a:p>
@@ -8264,7 +8264,7 @@
           <a:p>
             <a:fld id="{48A87A34-81AB-432B-8DAE-1953F412C126}" type="datetimeFigureOut">
               <a:rPr lang="en-US" dirty="0"/>
-              <a:t>6/1/2023</a:t>
+              <a:t>6/2/2023</a:t>
             </a:fld>
             <a:endParaRPr lang="en-US" dirty="0"/>
           </a:p>
@@ -8354,7 +8354,7 @@
           <a:p>
             <a:fld id="{48A87A34-81AB-432B-8DAE-1953F412C126}" type="datetimeFigureOut">
               <a:rPr lang="en-US" dirty="0"/>
-              <a:t>6/1/2023</a:t>
+              <a:t>6/2/2023</a:t>
             </a:fld>
             <a:endParaRPr lang="en-US" dirty="0"/>
           </a:p>
@@ -8598,7 +8598,7 @@
           <a:p>
             <a:fld id="{48A87A34-81AB-432B-8DAE-1953F412C126}" type="datetimeFigureOut">
               <a:rPr lang="en-US" dirty="0"/>
-              <a:t>6/1/2023</a:t>
+              <a:t>6/2/2023</a:t>
             </a:fld>
             <a:endParaRPr lang="en-US" dirty="0"/>
           </a:p>
@@ -8873,7 +8873,7 @@
           <a:p>
             <a:fld id="{48A87A34-81AB-432B-8DAE-1953F412C126}" type="datetimeFigureOut">
               <a:rPr lang="en-US" dirty="0"/>
-              <a:t>6/1/2023</a:t>
+              <a:t>6/2/2023</a:t>
             </a:fld>
             <a:endParaRPr lang="en-US" dirty="0"/>
           </a:p>
@@ -8991,7 +8991,7 @@
           <a:noFill/>
           <a:extLst>
             <a:ext uri="{909E8E84-426E-40dd-AFC4-6F175D3DCCD1}">
-              <a14:hiddenFill xmlns:a14="http://schemas.microsoft.com/office/drawing/2010/main" xmlns="">
+              <a14:hiddenFill xmlns="" xmlns:a14="http://schemas.microsoft.com/office/drawing/2010/main">
                 <a:solidFill>
                   <a:srgbClr val="FFFFFF"/>
                 </a:solidFill>
@@ -9065,7 +9065,7 @@
               </a:ln>
               <a:extLst>
                 <a:ext uri="{91240B29-F687-4f45-9708-019B960494DF}">
-                  <a14:hiddenLine xmlns:a14="http://schemas.microsoft.com/office/drawing/2010/main" xmlns="" w="9525">
+                  <a14:hiddenLine xmlns="" xmlns:a14="http://schemas.microsoft.com/office/drawing/2010/main" w="9525">
                     <a:solidFill>
                       <a:srgbClr val="000000"/>
                     </a:solidFill>
@@ -9155,7 +9155,7 @@
               </a:ln>
               <a:extLst>
                 <a:ext uri="{91240B29-F687-4f45-9708-019B960494DF}">
-                  <a14:hiddenLine xmlns:a14="http://schemas.microsoft.com/office/drawing/2010/main" xmlns="" w="9525">
+                  <a14:hiddenLine xmlns="" xmlns:a14="http://schemas.microsoft.com/office/drawing/2010/main" w="9525">
                     <a:solidFill>
                       <a:srgbClr val="000000"/>
                     </a:solidFill>
@@ -9245,7 +9245,7 @@
               </a:ln>
               <a:extLst>
                 <a:ext uri="{91240B29-F687-4f45-9708-019B960494DF}">
-                  <a14:hiddenLine xmlns:a14="http://schemas.microsoft.com/office/drawing/2010/main" xmlns="" w="9525">
+                  <a14:hiddenLine xmlns="" xmlns:a14="http://schemas.microsoft.com/office/drawing/2010/main" w="9525">
                     <a:solidFill>
                       <a:srgbClr val="000000"/>
                     </a:solidFill>
@@ -9307,7 +9307,7 @@
               </a:ln>
               <a:extLst>
                 <a:ext uri="{91240B29-F687-4f45-9708-019B960494DF}">
-                  <a14:hiddenLine xmlns:a14="http://schemas.microsoft.com/office/drawing/2010/main" xmlns="" w="9525">
+                  <a14:hiddenLine xmlns="" xmlns:a14="http://schemas.microsoft.com/office/drawing/2010/main" w="9525">
                     <a:solidFill>
                       <a:srgbClr val="000000"/>
                     </a:solidFill>
@@ -9397,7 +9397,7 @@
               </a:ln>
               <a:extLst>
                 <a:ext uri="{91240B29-F687-4f45-9708-019B960494DF}">
-                  <a14:hiddenLine xmlns:a14="http://schemas.microsoft.com/office/drawing/2010/main" xmlns="" w="9525">
+                  <a14:hiddenLine xmlns="" xmlns:a14="http://schemas.microsoft.com/office/drawing/2010/main" w="9525">
                     <a:solidFill>
                       <a:srgbClr val="000000"/>
                     </a:solidFill>
@@ -9459,7 +9459,7 @@
               </a:ln>
               <a:extLst>
                 <a:ext uri="{91240B29-F687-4f45-9708-019B960494DF}">
-                  <a14:hiddenLine xmlns:a14="http://schemas.microsoft.com/office/drawing/2010/main" xmlns="" w="9525">
+                  <a14:hiddenLine xmlns="" xmlns:a14="http://schemas.microsoft.com/office/drawing/2010/main" w="9525">
                     <a:solidFill>
                       <a:srgbClr val="000000"/>
                     </a:solidFill>
@@ -9521,7 +9521,7 @@
               </a:ln>
               <a:extLst>
                 <a:ext uri="{91240B29-F687-4f45-9708-019B960494DF}">
-                  <a14:hiddenLine xmlns:a14="http://schemas.microsoft.com/office/drawing/2010/main" xmlns="" w="9525">
+                  <a14:hiddenLine xmlns="" xmlns:a14="http://schemas.microsoft.com/office/drawing/2010/main" w="9525">
                     <a:solidFill>
                       <a:srgbClr val="000000"/>
                     </a:solidFill>
@@ -9611,7 +9611,7 @@
               </a:ln>
               <a:extLst>
                 <a:ext uri="{91240B29-F687-4f45-9708-019B960494DF}">
-                  <a14:hiddenLine xmlns:a14="http://schemas.microsoft.com/office/drawing/2010/main" xmlns="" w="9525">
+                  <a14:hiddenLine xmlns="" xmlns:a14="http://schemas.microsoft.com/office/drawing/2010/main" w="9525">
                     <a:solidFill>
                       <a:srgbClr val="000000"/>
                     </a:solidFill>
@@ -9701,7 +9701,7 @@
               </a:ln>
               <a:extLst>
                 <a:ext uri="{91240B29-F687-4f45-9708-019B960494DF}">
-                  <a14:hiddenLine xmlns:a14="http://schemas.microsoft.com/office/drawing/2010/main" xmlns="" w="9525">
+                  <a14:hiddenLine xmlns="" xmlns:a14="http://schemas.microsoft.com/office/drawing/2010/main" w="9525">
                     <a:solidFill>
                       <a:srgbClr val="000000"/>
                     </a:solidFill>
@@ -9763,7 +9763,7 @@
               </a:ln>
               <a:extLst>
                 <a:ext uri="{91240B29-F687-4f45-9708-019B960494DF}">
-                  <a14:hiddenLine xmlns:a14="http://schemas.microsoft.com/office/drawing/2010/main" xmlns="" w="9525">
+                  <a14:hiddenLine xmlns="" xmlns:a14="http://schemas.microsoft.com/office/drawing/2010/main" w="9525">
                     <a:solidFill>
                       <a:srgbClr val="000000"/>
                     </a:solidFill>
@@ -9873,7 +9873,7 @@
               </a:ln>
               <a:extLst>
                 <a:ext uri="{91240B29-F687-4f45-9708-019B960494DF}">
-                  <a14:hiddenLine xmlns:a14="http://schemas.microsoft.com/office/drawing/2010/main" xmlns="" w="9525">
+                  <a14:hiddenLine xmlns="" xmlns:a14="http://schemas.microsoft.com/office/drawing/2010/main" w="9525">
                     <a:solidFill>
                       <a:srgbClr val="000000"/>
                     </a:solidFill>
@@ -9957,7 +9957,7 @@
               </a:ln>
               <a:extLst>
                 <a:ext uri="{91240B29-F687-4f45-9708-019B960494DF}">
-                  <a14:hiddenLine xmlns:a14="http://schemas.microsoft.com/office/drawing/2010/main" xmlns="" w="9525">
+                  <a14:hiddenLine xmlns="" xmlns:a14="http://schemas.microsoft.com/office/drawing/2010/main" w="9525">
                     <a:solidFill>
                       <a:srgbClr val="000000"/>
                     </a:solidFill>
@@ -10019,7 +10019,7 @@
               </a:ln>
               <a:extLst>
                 <a:ext uri="{91240B29-F687-4f45-9708-019B960494DF}">
-                  <a14:hiddenLine xmlns:a14="http://schemas.microsoft.com/office/drawing/2010/main" xmlns="" w="9525">
+                  <a14:hiddenLine xmlns="" xmlns:a14="http://schemas.microsoft.com/office/drawing/2010/main" w="9525">
                     <a:solidFill>
                       <a:srgbClr val="000000"/>
                     </a:solidFill>
@@ -10081,7 +10081,7 @@
               </a:ln>
               <a:extLst>
                 <a:ext uri="{91240B29-F687-4f45-9708-019B960494DF}">
-                  <a14:hiddenLine xmlns:a14="http://schemas.microsoft.com/office/drawing/2010/main" xmlns="" w="9525">
+                  <a14:hiddenLine xmlns="" xmlns:a14="http://schemas.microsoft.com/office/drawing/2010/main" w="9525">
                     <a:solidFill>
                       <a:srgbClr val="000000"/>
                     </a:solidFill>
@@ -10171,7 +10171,7 @@
               </a:ln>
               <a:extLst>
                 <a:ext uri="{91240B29-F687-4f45-9708-019B960494DF}">
-                  <a14:hiddenLine xmlns:a14="http://schemas.microsoft.com/office/drawing/2010/main" xmlns="" w="9525">
+                  <a14:hiddenLine xmlns="" xmlns:a14="http://schemas.microsoft.com/office/drawing/2010/main" w="9525">
                     <a:solidFill>
                       <a:srgbClr val="000000"/>
                     </a:solidFill>
@@ -10205,7 +10205,7 @@
               </a:ln>
               <a:extLst>
                 <a:ext uri="{91240B29-F687-4f45-9708-019B960494DF}">
-                  <a14:hiddenLine xmlns:a14="http://schemas.microsoft.com/office/drawing/2010/main" xmlns="" w="9525">
+                  <a14:hiddenLine xmlns="" xmlns:a14="http://schemas.microsoft.com/office/drawing/2010/main" w="9525">
                     <a:solidFill>
                       <a:srgbClr val="000000"/>
                     </a:solidFill>
@@ -10270,7 +10270,7 @@
               </a:ln>
               <a:extLst>
                 <a:ext uri="{91240B29-F687-4f45-9708-019B960494DF}">
-                  <a14:hiddenLine xmlns:a14="http://schemas.microsoft.com/office/drawing/2010/main" xmlns="" w="9525">
+                  <a14:hiddenLine xmlns="" xmlns:a14="http://schemas.microsoft.com/office/drawing/2010/main" w="9525">
                     <a:solidFill>
                       <a:srgbClr val="000000"/>
                     </a:solidFill>
@@ -10360,7 +10360,7 @@
               </a:ln>
               <a:extLst>
                 <a:ext uri="{91240B29-F687-4f45-9708-019B960494DF}">
-                  <a14:hiddenLine xmlns:a14="http://schemas.microsoft.com/office/drawing/2010/main" xmlns="" w="9525">
+                  <a14:hiddenLine xmlns="" xmlns:a14="http://schemas.microsoft.com/office/drawing/2010/main" w="9525">
                     <a:solidFill>
                       <a:srgbClr val="000000"/>
                     </a:solidFill>
@@ -10422,7 +10422,7 @@
               </a:ln>
               <a:extLst>
                 <a:ext uri="{91240B29-F687-4f45-9708-019B960494DF}">
-                  <a14:hiddenLine xmlns:a14="http://schemas.microsoft.com/office/drawing/2010/main" xmlns="" w="9525">
+                  <a14:hiddenLine xmlns="" xmlns:a14="http://schemas.microsoft.com/office/drawing/2010/main" w="9525">
                     <a:solidFill>
                       <a:srgbClr val="000000"/>
                     </a:solidFill>
@@ -10512,7 +10512,7 @@
               </a:ln>
               <a:extLst>
                 <a:ext uri="{91240B29-F687-4f45-9708-019B960494DF}">
-                  <a14:hiddenLine xmlns:a14="http://schemas.microsoft.com/office/drawing/2010/main" xmlns="" w="9525">
+                  <a14:hiddenLine xmlns="" xmlns:a14="http://schemas.microsoft.com/office/drawing/2010/main" w="9525">
                     <a:solidFill>
                       <a:srgbClr val="000000"/>
                     </a:solidFill>
@@ -10577,7 +10577,7 @@
               </a:ln>
               <a:extLst>
                 <a:ext uri="{91240B29-F687-4f45-9708-019B960494DF}">
-                  <a14:hiddenLine xmlns:a14="http://schemas.microsoft.com/office/drawing/2010/main" xmlns="" w="9525">
+                  <a14:hiddenLine xmlns="" xmlns:a14="http://schemas.microsoft.com/office/drawing/2010/main" w="9525">
                     <a:solidFill>
                       <a:srgbClr val="000000"/>
                     </a:solidFill>
@@ -10639,7 +10639,7 @@
               </a:ln>
               <a:extLst>
                 <a:ext uri="{91240B29-F687-4f45-9708-019B960494DF}">
-                  <a14:hiddenLine xmlns:a14="http://schemas.microsoft.com/office/drawing/2010/main" xmlns="" w="9525">
+                  <a14:hiddenLine xmlns="" xmlns:a14="http://schemas.microsoft.com/office/drawing/2010/main" w="9525">
                     <a:solidFill>
                       <a:srgbClr val="000000"/>
                     </a:solidFill>
@@ -10729,7 +10729,7 @@
               </a:ln>
               <a:extLst>
                 <a:ext uri="{91240B29-F687-4f45-9708-019B960494DF}">
-                  <a14:hiddenLine xmlns:a14="http://schemas.microsoft.com/office/drawing/2010/main" xmlns="" w="9525">
+                  <a14:hiddenLine xmlns="" xmlns:a14="http://schemas.microsoft.com/office/drawing/2010/main" w="9525">
                     <a:solidFill>
                       <a:srgbClr val="000000"/>
                     </a:solidFill>
@@ -10819,7 +10819,7 @@
               </a:ln>
               <a:extLst>
                 <a:ext uri="{91240B29-F687-4f45-9708-019B960494DF}">
-                  <a14:hiddenLine xmlns:a14="http://schemas.microsoft.com/office/drawing/2010/main" xmlns="" w="9525">
+                  <a14:hiddenLine xmlns="" xmlns:a14="http://schemas.microsoft.com/office/drawing/2010/main" w="9525">
                     <a:solidFill>
                       <a:srgbClr val="000000"/>
                     </a:solidFill>
@@ -10884,7 +10884,7 @@
               </a:ln>
               <a:extLst>
                 <a:ext uri="{91240B29-F687-4f45-9708-019B960494DF}">
-                  <a14:hiddenLine xmlns:a14="http://schemas.microsoft.com/office/drawing/2010/main" xmlns="" w="9525">
+                  <a14:hiddenLine xmlns="" xmlns:a14="http://schemas.microsoft.com/office/drawing/2010/main" w="9525">
                     <a:solidFill>
                       <a:srgbClr val="000000"/>
                     </a:solidFill>
@@ -11004,7 +11004,7 @@
               </a:ln>
               <a:extLst>
                 <a:ext uri="{91240B29-F687-4f45-9708-019B960494DF}">
-                  <a14:hiddenLine xmlns:a14="http://schemas.microsoft.com/office/drawing/2010/main" xmlns="" w="9525">
+                  <a14:hiddenLine xmlns="" xmlns:a14="http://schemas.microsoft.com/office/drawing/2010/main" w="9525">
                     <a:solidFill>
                       <a:srgbClr val="000000"/>
                     </a:solidFill>
@@ -11085,7 +11085,7 @@
               </a:ln>
               <a:extLst>
                 <a:ext uri="{91240B29-F687-4f45-9708-019B960494DF}">
-                  <a14:hiddenLine xmlns:a14="http://schemas.microsoft.com/office/drawing/2010/main" xmlns="" w="9525">
+                  <a14:hiddenLine xmlns="" xmlns:a14="http://schemas.microsoft.com/office/drawing/2010/main" w="9525">
                     <a:solidFill>
                       <a:srgbClr val="000000"/>
                     </a:solidFill>
@@ -11200,7 +11200,7 @@
               </a:ln>
               <a:extLst>
                 <a:ext uri="{91240B29-F687-4f45-9708-019B960494DF}">
-                  <a14:hiddenLine xmlns:a14="http://schemas.microsoft.com/office/drawing/2010/main" xmlns="" w="9525">
+                  <a14:hiddenLine xmlns="" xmlns:a14="http://schemas.microsoft.com/office/drawing/2010/main" w="9525">
                     <a:solidFill>
                       <a:srgbClr val="000000"/>
                     </a:solidFill>
@@ -11290,7 +11290,7 @@
               </a:ln>
               <a:extLst>
                 <a:ext uri="{91240B29-F687-4f45-9708-019B960494DF}">
-                  <a14:hiddenLine xmlns:a14="http://schemas.microsoft.com/office/drawing/2010/main" xmlns="" w="9525">
+                  <a14:hiddenLine xmlns="" xmlns:a14="http://schemas.microsoft.com/office/drawing/2010/main" w="9525">
                     <a:solidFill>
                       <a:srgbClr val="000000"/>
                     </a:solidFill>
@@ -11355,7 +11355,7 @@
               </a:ln>
               <a:extLst>
                 <a:ext uri="{91240B29-F687-4f45-9708-019B960494DF}">
-                  <a14:hiddenLine xmlns:a14="http://schemas.microsoft.com/office/drawing/2010/main" xmlns="" w="9525">
+                  <a14:hiddenLine xmlns="" xmlns:a14="http://schemas.microsoft.com/office/drawing/2010/main" w="9525">
                     <a:solidFill>
                       <a:srgbClr val="000000"/>
                     </a:solidFill>
@@ -11445,7 +11445,7 @@
               </a:ln>
               <a:extLst>
                 <a:ext uri="{91240B29-F687-4f45-9708-019B960494DF}">
-                  <a14:hiddenLine xmlns:a14="http://schemas.microsoft.com/office/drawing/2010/main" xmlns="" w="9525">
+                  <a14:hiddenLine xmlns="" xmlns:a14="http://schemas.microsoft.com/office/drawing/2010/main" w="9525">
                     <a:solidFill>
                       <a:srgbClr val="000000"/>
                     </a:solidFill>
@@ -11513,7 +11513,7 @@
               </a:ln>
               <a:extLst>
                 <a:ext uri="{91240B29-F687-4f45-9708-019B960494DF}">
-                  <a14:hiddenLine xmlns:a14="http://schemas.microsoft.com/office/drawing/2010/main" xmlns="" w="9525">
+                  <a14:hiddenLine xmlns="" xmlns:a14="http://schemas.microsoft.com/office/drawing/2010/main" w="9525">
                     <a:solidFill>
                       <a:srgbClr val="000000"/>
                     </a:solidFill>
@@ -11603,7 +11603,7 @@
               </a:ln>
               <a:extLst>
                 <a:ext uri="{91240B29-F687-4f45-9708-019B960494DF}">
-                  <a14:hiddenLine xmlns:a14="http://schemas.microsoft.com/office/drawing/2010/main" xmlns="" w="9525">
+                  <a14:hiddenLine xmlns="" xmlns:a14="http://schemas.microsoft.com/office/drawing/2010/main" w="9525">
                     <a:solidFill>
                       <a:srgbClr val="000000"/>
                     </a:solidFill>
@@ -11671,7 +11671,7 @@
               </a:ln>
               <a:extLst>
                 <a:ext uri="{91240B29-F687-4f45-9708-019B960494DF}">
-                  <a14:hiddenLine xmlns:a14="http://schemas.microsoft.com/office/drawing/2010/main" xmlns="" w="9525">
+                  <a14:hiddenLine xmlns="" xmlns:a14="http://schemas.microsoft.com/office/drawing/2010/main" w="9525">
                     <a:solidFill>
                       <a:srgbClr val="000000"/>
                     </a:solidFill>
@@ -11761,7 +11761,7 @@
               </a:ln>
               <a:extLst>
                 <a:ext uri="{91240B29-F687-4f45-9708-019B960494DF}">
-                  <a14:hiddenLine xmlns:a14="http://schemas.microsoft.com/office/drawing/2010/main" xmlns="" w="9525">
+                  <a14:hiddenLine xmlns="" xmlns:a14="http://schemas.microsoft.com/office/drawing/2010/main" w="9525">
                     <a:solidFill>
                       <a:srgbClr val="000000"/>
                     </a:solidFill>
@@ -11795,7 +11795,7 @@
               </a:ln>
               <a:extLst>
                 <a:ext uri="{91240B29-F687-4f45-9708-019B960494DF}">
-                  <a14:hiddenLine xmlns:a14="http://schemas.microsoft.com/office/drawing/2010/main" xmlns="" w="9525">
+                  <a14:hiddenLine xmlns="" xmlns:a14="http://schemas.microsoft.com/office/drawing/2010/main" w="9525">
                     <a:solidFill>
                       <a:srgbClr val="000000"/>
                     </a:solidFill>
@@ -11936,7 +11936,7 @@
             <a:fld id="{48A87A34-81AB-432B-8DAE-1953F412C126}" type="datetimeFigureOut">
               <a:rPr lang="en-US" dirty="0"/>
               <a:pPr/>
-              <a:t>6/1/2023</a:t>
+              <a:t>6/2/2023</a:t>
             </a:fld>
             <a:endParaRPr lang="en-US" dirty="0"/>
           </a:p>
@@ -13067,17 +13067,45 @@
                 <a:solidFill>
                   <a:srgbClr val="FFC66D"/>
                 </a:solidFill>
+                <a:latin typeface="JetBrains Mono"/>
+              </a:rPr>
+              <a:t>p</a:t>
+            </a:r>
+            <a:r>
+              <a:rPr lang="en-US" sz="1600" dirty="0">
+                <a:solidFill>
+                  <a:srgbClr val="FFC66D"/>
+                </a:solidFill>
                 <a:effectLst/>
                 <a:latin typeface="JetBrains Mono"/>
               </a:rPr>
-              <a:t>Print </a:t>
+              <a:t>rint and </a:t>
+            </a:r>
+            <a:r>
+              <a:rPr lang="pt-PT" sz="1600" dirty="0" err="1">
+                <a:solidFill>
+                  <a:srgbClr val="FFC66D"/>
+                </a:solidFill>
+                <a:effectLst/>
+                <a:latin typeface="JetBrains Mono"/>
+              </a:rPr>
+              <a:t>printPath</a:t>
+            </a:r>
+            <a:r>
+              <a:rPr lang="pt-PT" sz="1600" dirty="0">
+                <a:solidFill>
+                  <a:srgbClr val="A9B7C6"/>
+                </a:solidFill>
+                <a:latin typeface="JetBrains Mono"/>
+              </a:rPr>
+              <a:t> </a:t>
             </a:r>
             <a:r>
               <a:rPr lang="en-US" sz="1600" dirty="0">
                 <a:effectLst/>
                 <a:latin typeface="JetBrains Mono"/>
               </a:rPr>
-              <a:t>– Function used to print certain data</a:t>
+              <a:t>– Functions used to print certain data</a:t>
             </a:r>
             <a:endParaRPr kumimoji="0" lang="pt-PT" altLang="pt-PT" sz="2000" b="0" i="0" u="none" strike="noStrike" cap="none" normalizeH="0" baseline="0" dirty="0">
               <a:ln>
@@ -14306,14 +14334,36 @@
           </a:p>
           <a:p>
             <a:r>
-              <a:rPr lang="en-GB" sz="1600" dirty="0" err="1">
+              <a:rPr lang="pt-PT" sz="1600" dirty="0" err="1">
                 <a:solidFill>
                   <a:srgbClr val="FFC66D"/>
                 </a:solidFill>
                 <a:effectLst/>
                 <a:latin typeface="JetBrains Mono"/>
               </a:rPr>
-              <a:t>computeDistance</a:t>
+              <a:t>convertToRad</a:t>
+            </a:r>
+            <a:r>
+              <a:rPr lang="en-US" sz="1600" dirty="0">
+                <a:effectLst/>
+                <a:latin typeface="JetBrains Mono"/>
+              </a:rPr>
+              <a:t> – Returns the radian equivalent of a degree</a:t>
+            </a:r>
+            <a:endParaRPr lang="en-US" sz="1600" dirty="0">
+              <a:latin typeface="JetBrains Mono"/>
+            </a:endParaRPr>
+          </a:p>
+          <a:p>
+            <a:r>
+              <a:rPr lang="pt-PT" sz="1600" dirty="0" err="1">
+                <a:solidFill>
+                  <a:srgbClr val="FFC66D"/>
+                </a:solidFill>
+                <a:effectLst/>
+                <a:latin typeface="JetBrains Mono"/>
+              </a:rPr>
+              <a:t>distanceBetweenNodes</a:t>
             </a:r>
             <a:r>
               <a:rPr lang="en-GB" sz="1600" dirty="0">
@@ -14691,6 +14741,38 @@
                 <a:latin typeface="JetBrains Mono"/>
               </a:rPr>
               <a:t>– Triangular Approximation approach to the TSP problem</a:t>
+            </a:r>
+          </a:p>
+          <a:p>
+            <a:pPr>
+              <a:defRPr/>
+            </a:pPr>
+            <a:r>
+              <a:rPr lang="en-GB" sz="1600" dirty="0" err="1">
+                <a:solidFill>
+                  <a:srgbClr val="FFC66D"/>
+                </a:solidFill>
+                <a:effectLst/>
+                <a:latin typeface="JetBrains Mono"/>
+              </a:rPr>
+              <a:t>triangularAproximationHeurToy</a:t>
+            </a:r>
+            <a:r>
+              <a:rPr lang="en-GB" sz="1600" dirty="0">
+                <a:solidFill>
+                  <a:srgbClr val="FFC66D"/>
+                </a:solidFill>
+                <a:effectLst/>
+                <a:latin typeface="JetBrains Mono"/>
+              </a:rPr>
+              <a:t> </a:t>
+            </a:r>
+            <a:r>
+              <a:rPr lang="en-GB" sz="1600" dirty="0">
+                <a:effectLst/>
+                <a:latin typeface="JetBrains Mono"/>
+              </a:rPr>
+              <a:t>– Triangular Approximation approach to the TSP problem for the Toy graphs</a:t>
             </a:r>
             <a:endParaRPr lang="en-GB" sz="1600" dirty="0">
               <a:latin typeface="JetBrains Mono"/>
@@ -15179,18 +15261,18 @@
 </file>
 
 <file path=customXml/item1.xml><?xml version="1.0" encoding="utf-8"?>
+<p:properties xmlns:p="http://schemas.microsoft.com/office/2006/metadata/properties" xmlns:xsi="http://www.w3.org/2001/XMLSchema-instance" xmlns:pc="http://schemas.microsoft.com/office/infopath/2007/PartnerControls">
+  <documentManagement/>
+</p:properties>
+</file>
+
+<file path=customXml/item2.xml><?xml version="1.0" encoding="utf-8"?>
 <?mso-contentType ?>
 <FormTemplates xmlns="http://schemas.microsoft.com/sharepoint/v3/contenttype/forms">
   <Display>DocumentLibraryForm</Display>
   <Edit>DocumentLibraryForm</Edit>
   <New>DocumentLibraryForm</New>
 </FormTemplates>
-</file>
-
-<file path=customXml/item2.xml><?xml version="1.0" encoding="utf-8"?>
-<p:properties xmlns:p="http://schemas.microsoft.com/office/2006/metadata/properties" xmlns:xsi="http://www.w3.org/2001/XMLSchema-instance" xmlns:pc="http://schemas.microsoft.com/office/infopath/2007/PartnerControls">
-  <documentManagement/>
-</p:properties>
 </file>
 
 <file path=customXml/item3.xml><?xml version="1.0" encoding="utf-8"?>
@@ -15308,14 +15390,6 @@
 </file>
 
 <file path=customXml/itemProps1.xml><?xml version="1.0" encoding="utf-8"?>
-<ds:datastoreItem xmlns:ds="http://schemas.openxmlformats.org/officeDocument/2006/customXml" ds:itemID="{D51E79FD-84A2-4D99-AE38-6BF45A3426BF}">
-  <ds:schemaRefs>
-    <ds:schemaRef ds:uri="http://schemas.microsoft.com/sharepoint/v3/contenttype/forms"/>
-  </ds:schemaRefs>
-</ds:datastoreItem>
-</file>
-
-<file path=customXml/itemProps2.xml><?xml version="1.0" encoding="utf-8"?>
 <ds:datastoreItem xmlns:ds="http://schemas.openxmlformats.org/officeDocument/2006/customXml" ds:itemID="{30F54BB1-1701-417A-9430-1DDD3233E544}">
   <ds:schemaRefs>
     <ds:schemaRef ds:uri="http://schemas.microsoft.com/office/2006/documentManagement/types"/>
@@ -15326,6 +15400,14 @@
     <ds:schemaRef ds:uri="http://purl.org/dc/terms/"/>
     <ds:schemaRef ds:uri="http://www.w3.org/XML/1998/namespace"/>
     <ds:schemaRef ds:uri="http://purl.org/dc/dcmitype/"/>
+  </ds:schemaRefs>
+</ds:datastoreItem>
+</file>
+
+<file path=customXml/itemProps2.xml><?xml version="1.0" encoding="utf-8"?>
+<ds:datastoreItem xmlns:ds="http://schemas.openxmlformats.org/officeDocument/2006/customXml" ds:itemID="{D51E79FD-84A2-4D99-AE38-6BF45A3426BF}">
+  <ds:schemaRefs>
+    <ds:schemaRef ds:uri="http://schemas.microsoft.com/sharepoint/v3/contenttype/forms"/>
   </ds:schemaRefs>
 </ds:datastoreItem>
 </file>

</xml_diff>

<commit_message>
I think this is it
</commit_message>
<xml_diff>
--- a/DA2.pptx
+++ b/DA2.pptx
@@ -14,6 +14,7 @@
     <p:sldId id="267" r:id="rId11"/>
     <p:sldId id="268" r:id="rId12"/>
     <p:sldId id="261" r:id="rId13"/>
+    <p:sldId id="269" r:id="rId14"/>
   </p:sldIdLst>
   <p:sldSz cx="12192000" cy="6858000"/>
   <p:notesSz cx="6858000" cy="9144000"/>
@@ -177,7 +178,7 @@
           <a:noFill/>
           <a:extLst>
             <a:ext uri="{909E8E84-426E-40dd-AFC4-6F175D3DCCD1}">
-              <a14:hiddenFill xmlns:a14="http://schemas.microsoft.com/office/drawing/2010/main" xmlns="">
+              <a14:hiddenFill xmlns="" xmlns:a14="http://schemas.microsoft.com/office/drawing/2010/main">
                 <a:solidFill>
                   <a:srgbClr val="FFFFFF"/>
                 </a:solidFill>
@@ -236,7 +237,7 @@
             </a:ln>
             <a:extLst>
               <a:ext uri="{91240B29-F687-4f45-9708-019B960494DF}">
-                <a14:hiddenLine xmlns:a14="http://schemas.microsoft.com/office/drawing/2010/main" xmlns="" w="9525">
+                <a14:hiddenLine xmlns="" xmlns:a14="http://schemas.microsoft.com/office/drawing/2010/main" w="9525">
                   <a:solidFill>
                     <a:srgbClr val="000000"/>
                   </a:solidFill>
@@ -326,7 +327,7 @@
             </a:ln>
             <a:extLst>
               <a:ext uri="{91240B29-F687-4f45-9708-019B960494DF}">
-                <a14:hiddenLine xmlns:a14="http://schemas.microsoft.com/office/drawing/2010/main" xmlns="" w="9525">
+                <a14:hiddenLine xmlns="" xmlns:a14="http://schemas.microsoft.com/office/drawing/2010/main" w="9525">
                   <a:solidFill>
                     <a:srgbClr val="000000"/>
                   </a:solidFill>
@@ -416,7 +417,7 @@
             </a:ln>
             <a:extLst>
               <a:ext uri="{91240B29-F687-4f45-9708-019B960494DF}">
-                <a14:hiddenLine xmlns:a14="http://schemas.microsoft.com/office/drawing/2010/main" xmlns="" w="9525">
+                <a14:hiddenLine xmlns="" xmlns:a14="http://schemas.microsoft.com/office/drawing/2010/main" w="9525">
                   <a:solidFill>
                     <a:srgbClr val="000000"/>
                   </a:solidFill>
@@ -450,7 +451,7 @@
             </a:ln>
             <a:extLst>
               <a:ext uri="{91240B29-F687-4f45-9708-019B960494DF}">
-                <a14:hiddenLine xmlns:a14="http://schemas.microsoft.com/office/drawing/2010/main" xmlns="" w="9525">
+                <a14:hiddenLine xmlns="" xmlns:a14="http://schemas.microsoft.com/office/drawing/2010/main" w="9525">
                   <a:solidFill>
                     <a:srgbClr val="000000"/>
                   </a:solidFill>
@@ -540,7 +541,7 @@
             </a:ln>
             <a:extLst>
               <a:ext uri="{91240B29-F687-4f45-9708-019B960494DF}">
-                <a14:hiddenLine xmlns:a14="http://schemas.microsoft.com/office/drawing/2010/main" xmlns="" w="9525">
+                <a14:hiddenLine xmlns="" xmlns:a14="http://schemas.microsoft.com/office/drawing/2010/main" w="9525">
                   <a:solidFill>
                     <a:srgbClr val="000000"/>
                   </a:solidFill>
@@ -602,7 +603,7 @@
             </a:ln>
             <a:extLst>
               <a:ext uri="{91240B29-F687-4f45-9708-019B960494DF}">
-                <a14:hiddenLine xmlns:a14="http://schemas.microsoft.com/office/drawing/2010/main" xmlns="" w="9525">
+                <a14:hiddenLine xmlns="" xmlns:a14="http://schemas.microsoft.com/office/drawing/2010/main" w="9525">
                   <a:solidFill>
                     <a:srgbClr val="000000"/>
                   </a:solidFill>
@@ -664,7 +665,7 @@
             </a:ln>
             <a:extLst>
               <a:ext uri="{91240B29-F687-4f45-9708-019B960494DF}">
-                <a14:hiddenLine xmlns:a14="http://schemas.microsoft.com/office/drawing/2010/main" xmlns="" w="9525">
+                <a14:hiddenLine xmlns="" xmlns:a14="http://schemas.microsoft.com/office/drawing/2010/main" w="9525">
                   <a:solidFill>
                     <a:srgbClr val="000000"/>
                   </a:solidFill>
@@ -754,7 +755,7 @@
             </a:ln>
             <a:extLst>
               <a:ext uri="{91240B29-F687-4f45-9708-019B960494DF}">
-                <a14:hiddenLine xmlns:a14="http://schemas.microsoft.com/office/drawing/2010/main" xmlns="" w="9525">
+                <a14:hiddenLine xmlns="" xmlns:a14="http://schemas.microsoft.com/office/drawing/2010/main" w="9525">
                   <a:solidFill>
                     <a:srgbClr val="000000"/>
                   </a:solidFill>
@@ -816,7 +817,7 @@
             </a:ln>
             <a:extLst>
               <a:ext uri="{91240B29-F687-4f45-9708-019B960494DF}">
-                <a14:hiddenLine xmlns:a14="http://schemas.microsoft.com/office/drawing/2010/main" xmlns="" w="9525">
+                <a14:hiddenLine xmlns="" xmlns:a14="http://schemas.microsoft.com/office/drawing/2010/main" w="9525">
                   <a:solidFill>
                     <a:srgbClr val="000000"/>
                   </a:solidFill>
@@ -878,7 +879,7 @@
             </a:ln>
             <a:extLst>
               <a:ext uri="{91240B29-F687-4f45-9708-019B960494DF}">
-                <a14:hiddenLine xmlns:a14="http://schemas.microsoft.com/office/drawing/2010/main" xmlns="" w="9525">
+                <a14:hiddenLine xmlns="" xmlns:a14="http://schemas.microsoft.com/office/drawing/2010/main" w="9525">
                   <a:solidFill>
                     <a:srgbClr val="000000"/>
                   </a:solidFill>
@@ -968,7 +969,7 @@
             </a:ln>
             <a:extLst>
               <a:ext uri="{91240B29-F687-4f45-9708-019B960494DF}">
-                <a14:hiddenLine xmlns:a14="http://schemas.microsoft.com/office/drawing/2010/main" xmlns="" w="9525">
+                <a14:hiddenLine xmlns="" xmlns:a14="http://schemas.microsoft.com/office/drawing/2010/main" w="9525">
                   <a:solidFill>
                     <a:srgbClr val="000000"/>
                   </a:solidFill>
@@ -1058,7 +1059,7 @@
             </a:ln>
             <a:extLst>
               <a:ext uri="{91240B29-F687-4f45-9708-019B960494DF}">
-                <a14:hiddenLine xmlns:a14="http://schemas.microsoft.com/office/drawing/2010/main" xmlns="" w="9525">
+                <a14:hiddenLine xmlns="" xmlns:a14="http://schemas.microsoft.com/office/drawing/2010/main" w="9525">
                   <a:solidFill>
                     <a:srgbClr val="000000"/>
                   </a:solidFill>
@@ -1120,7 +1121,7 @@
             </a:ln>
             <a:extLst>
               <a:ext uri="{91240B29-F687-4f45-9708-019B960494DF}">
-                <a14:hiddenLine xmlns:a14="http://schemas.microsoft.com/office/drawing/2010/main" xmlns="" w="9525">
+                <a14:hiddenLine xmlns="" xmlns:a14="http://schemas.microsoft.com/office/drawing/2010/main" w="9525">
                   <a:solidFill>
                     <a:srgbClr val="000000"/>
                   </a:solidFill>
@@ -1230,7 +1231,7 @@
             </a:ln>
             <a:extLst>
               <a:ext uri="{91240B29-F687-4f45-9708-019B960494DF}">
-                <a14:hiddenLine xmlns:a14="http://schemas.microsoft.com/office/drawing/2010/main" xmlns="" w="9525">
+                <a14:hiddenLine xmlns="" xmlns:a14="http://schemas.microsoft.com/office/drawing/2010/main" w="9525">
                   <a:solidFill>
                     <a:srgbClr val="000000"/>
                   </a:solidFill>
@@ -1292,7 +1293,7 @@
             </a:ln>
             <a:extLst>
               <a:ext uri="{91240B29-F687-4f45-9708-019B960494DF}">
-                <a14:hiddenLine xmlns:a14="http://schemas.microsoft.com/office/drawing/2010/main" xmlns="" w="9525">
+                <a14:hiddenLine xmlns="" xmlns:a14="http://schemas.microsoft.com/office/drawing/2010/main" w="9525">
                   <a:solidFill>
                     <a:srgbClr val="000000"/>
                   </a:solidFill>
@@ -1382,7 +1383,7 @@
             </a:ln>
             <a:extLst>
               <a:ext uri="{91240B29-F687-4f45-9708-019B960494DF}">
-                <a14:hiddenLine xmlns:a14="http://schemas.microsoft.com/office/drawing/2010/main" xmlns="" w="9525">
+                <a14:hiddenLine xmlns="" xmlns:a14="http://schemas.microsoft.com/office/drawing/2010/main" w="9525">
                   <a:solidFill>
                     <a:srgbClr val="000000"/>
                   </a:solidFill>
@@ -1472,7 +1473,7 @@
             </a:ln>
             <a:extLst>
               <a:ext uri="{91240B29-F687-4f45-9708-019B960494DF}">
-                <a14:hiddenLine xmlns:a14="http://schemas.microsoft.com/office/drawing/2010/main" xmlns="" w="9525">
+                <a14:hiddenLine xmlns="" xmlns:a14="http://schemas.microsoft.com/office/drawing/2010/main" w="9525">
                   <a:solidFill>
                     <a:srgbClr val="000000"/>
                   </a:solidFill>
@@ -1534,7 +1535,7 @@
             </a:ln>
             <a:extLst>
               <a:ext uri="{91240B29-F687-4f45-9708-019B960494DF}">
-                <a14:hiddenLine xmlns:a14="http://schemas.microsoft.com/office/drawing/2010/main" xmlns="" w="9525">
+                <a14:hiddenLine xmlns="" xmlns:a14="http://schemas.microsoft.com/office/drawing/2010/main" w="9525">
                   <a:solidFill>
                     <a:srgbClr val="000000"/>
                   </a:solidFill>
@@ -1624,7 +1625,7 @@
             </a:ln>
             <a:extLst>
               <a:ext uri="{91240B29-F687-4f45-9708-019B960494DF}">
-                <a14:hiddenLine xmlns:a14="http://schemas.microsoft.com/office/drawing/2010/main" xmlns="" w="9525">
+                <a14:hiddenLine xmlns="" xmlns:a14="http://schemas.microsoft.com/office/drawing/2010/main" w="9525">
                   <a:solidFill>
                     <a:srgbClr val="000000"/>
                   </a:solidFill>
@@ -1714,7 +1715,7 @@
             </a:ln>
             <a:extLst>
               <a:ext uri="{91240B29-F687-4f45-9708-019B960494DF}">
-                <a14:hiddenLine xmlns:a14="http://schemas.microsoft.com/office/drawing/2010/main" xmlns="" w="9525">
+                <a14:hiddenLine xmlns="" xmlns:a14="http://schemas.microsoft.com/office/drawing/2010/main" w="9525">
                   <a:solidFill>
                     <a:srgbClr val="000000"/>
                   </a:solidFill>
@@ -1770,7 +1771,7 @@
             </a:ln>
             <a:extLst>
               <a:ext uri="{91240B29-F687-4f45-9708-019B960494DF}">
-                <a14:hiddenLine xmlns:a14="http://schemas.microsoft.com/office/drawing/2010/main" xmlns="" w="9525">
+                <a14:hiddenLine xmlns="" xmlns:a14="http://schemas.microsoft.com/office/drawing/2010/main" w="9525">
                   <a:solidFill>
                     <a:srgbClr val="000000"/>
                   </a:solidFill>
@@ -1860,7 +1861,7 @@
             </a:ln>
             <a:extLst>
               <a:ext uri="{91240B29-F687-4f45-9708-019B960494DF}">
-                <a14:hiddenLine xmlns:a14="http://schemas.microsoft.com/office/drawing/2010/main" xmlns="" w="9525">
+                <a14:hiddenLine xmlns="" xmlns:a14="http://schemas.microsoft.com/office/drawing/2010/main" w="9525">
                   <a:solidFill>
                     <a:srgbClr val="000000"/>
                   </a:solidFill>
@@ -1916,7 +1917,7 @@
             </a:ln>
             <a:extLst>
               <a:ext uri="{91240B29-F687-4f45-9708-019B960494DF}">
-                <a14:hiddenLine xmlns:a14="http://schemas.microsoft.com/office/drawing/2010/main" xmlns="" w="9525">
+                <a14:hiddenLine xmlns="" xmlns:a14="http://schemas.microsoft.com/office/drawing/2010/main" w="9525">
                   <a:solidFill>
                     <a:srgbClr val="000000"/>
                   </a:solidFill>
@@ -2006,7 +2007,7 @@
             </a:ln>
             <a:extLst>
               <a:ext uri="{91240B29-F687-4f45-9708-019B960494DF}">
-                <a14:hiddenLine xmlns:a14="http://schemas.microsoft.com/office/drawing/2010/main" xmlns="" w="9525">
+                <a14:hiddenLine xmlns="" xmlns:a14="http://schemas.microsoft.com/office/drawing/2010/main" w="9525">
                   <a:solidFill>
                     <a:srgbClr val="000000"/>
                   </a:solidFill>
@@ -2074,7 +2075,7 @@
             </a:ln>
             <a:extLst>
               <a:ext uri="{91240B29-F687-4f45-9708-019B960494DF}">
-                <a14:hiddenLine xmlns:a14="http://schemas.microsoft.com/office/drawing/2010/main" xmlns="" w="9525">
+                <a14:hiddenLine xmlns="" xmlns:a14="http://schemas.microsoft.com/office/drawing/2010/main" w="9525">
                   <a:solidFill>
                     <a:srgbClr val="000000"/>
                   </a:solidFill>
@@ -2164,7 +2165,7 @@
             </a:ln>
             <a:extLst>
               <a:ext uri="{91240B29-F687-4f45-9708-019B960494DF}">
-                <a14:hiddenLine xmlns:a14="http://schemas.microsoft.com/office/drawing/2010/main" xmlns="" w="9525">
+                <a14:hiddenLine xmlns="" xmlns:a14="http://schemas.microsoft.com/office/drawing/2010/main" w="9525">
                   <a:solidFill>
                     <a:srgbClr val="000000"/>
                   </a:solidFill>
@@ -2232,7 +2233,7 @@
             </a:ln>
             <a:extLst>
               <a:ext uri="{91240B29-F687-4f45-9708-019B960494DF}">
-                <a14:hiddenLine xmlns:a14="http://schemas.microsoft.com/office/drawing/2010/main" xmlns="" w="9525">
+                <a14:hiddenLine xmlns="" xmlns:a14="http://schemas.microsoft.com/office/drawing/2010/main" w="9525">
                   <a:solidFill>
                     <a:srgbClr val="000000"/>
                   </a:solidFill>
@@ -2322,7 +2323,7 @@
             </a:ln>
             <a:extLst>
               <a:ext uri="{91240B29-F687-4f45-9708-019B960494DF}">
-                <a14:hiddenLine xmlns:a14="http://schemas.microsoft.com/office/drawing/2010/main" xmlns="" w="9525">
+                <a14:hiddenLine xmlns="" xmlns:a14="http://schemas.microsoft.com/office/drawing/2010/main" w="9525">
                   <a:solidFill>
                     <a:srgbClr val="000000"/>
                   </a:solidFill>
@@ -2356,7 +2357,7 @@
             </a:ln>
             <a:extLst>
               <a:ext uri="{91240B29-F687-4f45-9708-019B960494DF}">
-                <a14:hiddenLine xmlns:a14="http://schemas.microsoft.com/office/drawing/2010/main" xmlns="" w="9525">
+                <a14:hiddenLine xmlns="" xmlns:a14="http://schemas.microsoft.com/office/drawing/2010/main" w="9525">
                   <a:solidFill>
                     <a:srgbClr val="000000"/>
                   </a:solidFill>
@@ -2446,7 +2447,7 @@
             </a:ln>
             <a:extLst>
               <a:ext uri="{91240B29-F687-4f45-9708-019B960494DF}">
-                <a14:hiddenLine xmlns:a14="http://schemas.microsoft.com/office/drawing/2010/main" xmlns="" w="9525">
+                <a14:hiddenLine xmlns="" xmlns:a14="http://schemas.microsoft.com/office/drawing/2010/main" w="9525">
                   <a:solidFill>
                     <a:srgbClr val="000000"/>
                   </a:solidFill>
@@ -2508,7 +2509,7 @@
             </a:ln>
             <a:extLst>
               <a:ext uri="{91240B29-F687-4f45-9708-019B960494DF}">
-                <a14:hiddenLine xmlns:a14="http://schemas.microsoft.com/office/drawing/2010/main" xmlns="" w="9525">
+                <a14:hiddenLine xmlns="" xmlns:a14="http://schemas.microsoft.com/office/drawing/2010/main" w="9525">
                   <a:solidFill>
                     <a:srgbClr val="000000"/>
                   </a:solidFill>
@@ -2570,7 +2571,7 @@
             </a:ln>
             <a:extLst>
               <a:ext uri="{91240B29-F687-4f45-9708-019B960494DF}">
-                <a14:hiddenLine xmlns:a14="http://schemas.microsoft.com/office/drawing/2010/main" xmlns="" w="9525">
+                <a14:hiddenLine xmlns="" xmlns:a14="http://schemas.microsoft.com/office/drawing/2010/main" w="9525">
                   <a:solidFill>
                     <a:srgbClr val="000000"/>
                   </a:solidFill>
@@ -2660,7 +2661,7 @@
             </a:ln>
             <a:extLst>
               <a:ext uri="{91240B29-F687-4f45-9708-019B960494DF}">
-                <a14:hiddenLine xmlns:a14="http://schemas.microsoft.com/office/drawing/2010/main" xmlns="" w="9525">
+                <a14:hiddenLine xmlns="" xmlns:a14="http://schemas.microsoft.com/office/drawing/2010/main" w="9525">
                   <a:solidFill>
                     <a:srgbClr val="000000"/>
                   </a:solidFill>
@@ -2728,7 +2729,7 @@
             </a:ln>
             <a:extLst>
               <a:ext uri="{91240B29-F687-4f45-9708-019B960494DF}">
-                <a14:hiddenLine xmlns:a14="http://schemas.microsoft.com/office/drawing/2010/main" xmlns="" w="9525">
+                <a14:hiddenLine xmlns="" xmlns:a14="http://schemas.microsoft.com/office/drawing/2010/main" w="9525">
                   <a:solidFill>
                     <a:srgbClr val="000000"/>
                   </a:solidFill>
@@ -2790,7 +2791,7 @@
             </a:ln>
             <a:extLst>
               <a:ext uri="{91240B29-F687-4f45-9708-019B960494DF}">
-                <a14:hiddenLine xmlns:a14="http://schemas.microsoft.com/office/drawing/2010/main" xmlns="" w="9525">
+                <a14:hiddenLine xmlns="" xmlns:a14="http://schemas.microsoft.com/office/drawing/2010/main" w="9525">
                   <a:solidFill>
                     <a:srgbClr val="000000"/>
                   </a:solidFill>
@@ -2880,7 +2881,7 @@
             </a:ln>
             <a:extLst>
               <a:ext uri="{91240B29-F687-4f45-9708-019B960494DF}">
-                <a14:hiddenLine xmlns:a14="http://schemas.microsoft.com/office/drawing/2010/main" xmlns="" w="9525">
+                <a14:hiddenLine xmlns="" xmlns:a14="http://schemas.microsoft.com/office/drawing/2010/main" w="9525">
                   <a:solidFill>
                     <a:srgbClr val="000000"/>
                   </a:solidFill>
@@ -2942,7 +2943,7 @@
             </a:ln>
             <a:extLst>
               <a:ext uri="{91240B29-F687-4f45-9708-019B960494DF}">
-                <a14:hiddenLine xmlns:a14="http://schemas.microsoft.com/office/drawing/2010/main" xmlns="" w="9525">
+                <a14:hiddenLine xmlns="" xmlns:a14="http://schemas.microsoft.com/office/drawing/2010/main" w="9525">
                   <a:solidFill>
                     <a:srgbClr val="000000"/>
                   </a:solidFill>
@@ -3032,7 +3033,7 @@
             </a:ln>
             <a:extLst>
               <a:ext uri="{91240B29-F687-4f45-9708-019B960494DF}">
-                <a14:hiddenLine xmlns:a14="http://schemas.microsoft.com/office/drawing/2010/main" xmlns="" w="9525">
+                <a14:hiddenLine xmlns="" xmlns:a14="http://schemas.microsoft.com/office/drawing/2010/main" w="9525">
                   <a:solidFill>
                     <a:srgbClr val="000000"/>
                   </a:solidFill>
@@ -3094,7 +3095,7 @@
             </a:ln>
             <a:extLst>
               <a:ext uri="{91240B29-F687-4f45-9708-019B960494DF}">
-                <a14:hiddenLine xmlns:a14="http://schemas.microsoft.com/office/drawing/2010/main" xmlns="" w="9525">
+                <a14:hiddenLine xmlns="" xmlns:a14="http://schemas.microsoft.com/office/drawing/2010/main" w="9525">
                   <a:solidFill>
                     <a:srgbClr val="000000"/>
                   </a:solidFill>
@@ -3184,7 +3185,7 @@
             </a:ln>
             <a:extLst>
               <a:ext uri="{91240B29-F687-4f45-9708-019B960494DF}">
-                <a14:hiddenLine xmlns:a14="http://schemas.microsoft.com/office/drawing/2010/main" xmlns="" w="9525">
+                <a14:hiddenLine xmlns="" xmlns:a14="http://schemas.microsoft.com/office/drawing/2010/main" w="9525">
                   <a:solidFill>
                     <a:srgbClr val="000000"/>
                   </a:solidFill>
@@ -3218,7 +3219,7 @@
             </a:ln>
             <a:extLst>
               <a:ext uri="{91240B29-F687-4f45-9708-019B960494DF}">
-                <a14:hiddenLine xmlns:a14="http://schemas.microsoft.com/office/drawing/2010/main" xmlns="" w="9525">
+                <a14:hiddenLine xmlns="" xmlns:a14="http://schemas.microsoft.com/office/drawing/2010/main" w="9525">
                   <a:solidFill>
                     <a:srgbClr val="000000"/>
                   </a:solidFill>
@@ -3283,7 +3284,7 @@
             </a:ln>
             <a:extLst>
               <a:ext uri="{91240B29-F687-4f45-9708-019B960494DF}">
-                <a14:hiddenLine xmlns:a14="http://schemas.microsoft.com/office/drawing/2010/main" xmlns="" w="9525">
+                <a14:hiddenLine xmlns="" xmlns:a14="http://schemas.microsoft.com/office/drawing/2010/main" w="9525">
                   <a:solidFill>
                     <a:srgbClr val="000000"/>
                   </a:solidFill>
@@ -3373,7 +3374,7 @@
             </a:ln>
             <a:extLst>
               <a:ext uri="{91240B29-F687-4f45-9708-019B960494DF}">
-                <a14:hiddenLine xmlns:a14="http://schemas.microsoft.com/office/drawing/2010/main" xmlns="" w="9525">
+                <a14:hiddenLine xmlns="" xmlns:a14="http://schemas.microsoft.com/office/drawing/2010/main" w="9525">
                   <a:solidFill>
                     <a:srgbClr val="000000"/>
                   </a:solidFill>
@@ -3435,7 +3436,7 @@
             </a:ln>
             <a:extLst>
               <a:ext uri="{91240B29-F687-4f45-9708-019B960494DF}">
-                <a14:hiddenLine xmlns:a14="http://schemas.microsoft.com/office/drawing/2010/main" xmlns="" w="9525">
+                <a14:hiddenLine xmlns="" xmlns:a14="http://schemas.microsoft.com/office/drawing/2010/main" w="9525">
                   <a:solidFill>
                     <a:srgbClr val="000000"/>
                   </a:solidFill>
@@ -3525,7 +3526,7 @@
             </a:ln>
             <a:extLst>
               <a:ext uri="{91240B29-F687-4f45-9708-019B960494DF}">
-                <a14:hiddenLine xmlns:a14="http://schemas.microsoft.com/office/drawing/2010/main" xmlns="" w="9525">
+                <a14:hiddenLine xmlns="" xmlns:a14="http://schemas.microsoft.com/office/drawing/2010/main" w="9525">
                   <a:solidFill>
                     <a:srgbClr val="000000"/>
                   </a:solidFill>
@@ -3615,7 +3616,7 @@
             </a:ln>
             <a:extLst>
               <a:ext uri="{91240B29-F687-4f45-9708-019B960494DF}">
-                <a14:hiddenLine xmlns:a14="http://schemas.microsoft.com/office/drawing/2010/main" xmlns="" w="9525">
+                <a14:hiddenLine xmlns="" xmlns:a14="http://schemas.microsoft.com/office/drawing/2010/main" w="9525">
                   <a:solidFill>
                     <a:srgbClr val="000000"/>
                   </a:solidFill>
@@ -3680,7 +3681,7 @@
             </a:ln>
             <a:extLst>
               <a:ext uri="{91240B29-F687-4f45-9708-019B960494DF}">
-                <a14:hiddenLine xmlns:a14="http://schemas.microsoft.com/office/drawing/2010/main" xmlns="" w="9525">
+                <a14:hiddenLine xmlns="" xmlns:a14="http://schemas.microsoft.com/office/drawing/2010/main" w="9525">
                   <a:solidFill>
                     <a:srgbClr val="000000"/>
                   </a:solidFill>
@@ -3742,7 +3743,7 @@
             </a:ln>
             <a:extLst>
               <a:ext uri="{91240B29-F687-4f45-9708-019B960494DF}">
-                <a14:hiddenLine xmlns:a14="http://schemas.microsoft.com/office/drawing/2010/main" xmlns="" w="9525">
+                <a14:hiddenLine xmlns="" xmlns:a14="http://schemas.microsoft.com/office/drawing/2010/main" w="9525">
                   <a:solidFill>
                     <a:srgbClr val="000000"/>
                   </a:solidFill>
@@ -3832,7 +3833,7 @@
             </a:ln>
             <a:extLst>
               <a:ext uri="{91240B29-F687-4f45-9708-019B960494DF}">
-                <a14:hiddenLine xmlns:a14="http://schemas.microsoft.com/office/drawing/2010/main" xmlns="" w="9525">
+                <a14:hiddenLine xmlns="" xmlns:a14="http://schemas.microsoft.com/office/drawing/2010/main" w="9525">
                   <a:solidFill>
                     <a:srgbClr val="000000"/>
                   </a:solidFill>
@@ -3922,7 +3923,7 @@
             </a:ln>
             <a:extLst>
               <a:ext uri="{91240B29-F687-4f45-9708-019B960494DF}">
-                <a14:hiddenLine xmlns:a14="http://schemas.microsoft.com/office/drawing/2010/main" xmlns="" w="9525">
+                <a14:hiddenLine xmlns="" xmlns:a14="http://schemas.microsoft.com/office/drawing/2010/main" w="9525">
                   <a:solidFill>
                     <a:srgbClr val="000000"/>
                   </a:solidFill>
@@ -3984,7 +3985,7 @@
             </a:ln>
             <a:extLst>
               <a:ext uri="{91240B29-F687-4f45-9708-019B960494DF}">
-                <a14:hiddenLine xmlns:a14="http://schemas.microsoft.com/office/drawing/2010/main" xmlns="" w="9525">
+                <a14:hiddenLine xmlns="" xmlns:a14="http://schemas.microsoft.com/office/drawing/2010/main" w="9525">
                   <a:solidFill>
                     <a:srgbClr val="000000"/>
                   </a:solidFill>
@@ -4104,7 +4105,7 @@
             </a:ln>
             <a:extLst>
               <a:ext uri="{91240B29-F687-4f45-9708-019B960494DF}">
-                <a14:hiddenLine xmlns:a14="http://schemas.microsoft.com/office/drawing/2010/main" xmlns="" w="9525">
+                <a14:hiddenLine xmlns="" xmlns:a14="http://schemas.microsoft.com/office/drawing/2010/main" w="9525">
                   <a:solidFill>
                     <a:srgbClr val="000000"/>
                   </a:solidFill>
@@ -4172,7 +4173,7 @@
             </a:ln>
             <a:extLst>
               <a:ext uri="{91240B29-F687-4f45-9708-019B960494DF}">
-                <a14:hiddenLine xmlns:a14="http://schemas.microsoft.com/office/drawing/2010/main" xmlns="" w="9525">
+                <a14:hiddenLine xmlns="" xmlns:a14="http://schemas.microsoft.com/office/drawing/2010/main" w="9525">
                   <a:solidFill>
                     <a:srgbClr val="000000"/>
                   </a:solidFill>
@@ -4262,7 +4263,7 @@
             </a:ln>
             <a:extLst>
               <a:ext uri="{91240B29-F687-4f45-9708-019B960494DF}">
-                <a14:hiddenLine xmlns:a14="http://schemas.microsoft.com/office/drawing/2010/main" xmlns="" w="9525">
+                <a14:hiddenLine xmlns="" xmlns:a14="http://schemas.microsoft.com/office/drawing/2010/main" w="9525">
                   <a:solidFill>
                     <a:srgbClr val="000000"/>
                   </a:solidFill>
@@ -4402,7 +4403,7 @@
           <a:p>
             <a:fld id="{48A87A34-81AB-432B-8DAE-1953F412C126}" type="datetimeFigureOut">
               <a:rPr lang="en-US" dirty="0"/>
-              <a:t>6/2/2023</a:t>
+              <a:t>6/4/2023</a:t>
             </a:fld>
             <a:endParaRPr lang="en-US" dirty="0"/>
           </a:p>
@@ -4664,7 +4665,7 @@
           <a:p>
             <a:fld id="{48A87A34-81AB-432B-8DAE-1953F412C126}" type="datetimeFigureOut">
               <a:rPr lang="en-US" dirty="0"/>
-              <a:t>6/2/2023</a:t>
+              <a:t>6/4/2023</a:t>
             </a:fld>
             <a:endParaRPr lang="en-US" dirty="0"/>
           </a:p>
@@ -4855,7 +4856,7 @@
           <a:p>
             <a:fld id="{48A87A34-81AB-432B-8DAE-1953F412C126}" type="datetimeFigureOut">
               <a:rPr lang="en-US" dirty="0"/>
-              <a:t>6/2/2023</a:t>
+              <a:t>6/4/2023</a:t>
             </a:fld>
             <a:endParaRPr lang="en-US" dirty="0"/>
           </a:p>
@@ -5113,7 +5114,7 @@
           <a:p>
             <a:fld id="{48A87A34-81AB-432B-8DAE-1953F412C126}" type="datetimeFigureOut">
               <a:rPr lang="en-US" dirty="0"/>
-              <a:t>6/2/2023</a:t>
+              <a:t>6/4/2023</a:t>
             </a:fld>
             <a:endParaRPr lang="en-US" dirty="0"/>
           </a:p>
@@ -5542,7 +5543,7 @@
           <a:p>
             <a:fld id="{48A87A34-81AB-432B-8DAE-1953F412C126}" type="datetimeFigureOut">
               <a:rPr lang="en-US" dirty="0"/>
-              <a:t>6/2/2023</a:t>
+              <a:t>6/4/2023</a:t>
             </a:fld>
             <a:endParaRPr lang="en-US" dirty="0"/>
           </a:p>
@@ -6083,7 +6084,7 @@
           <a:p>
             <a:fld id="{48A87A34-81AB-432B-8DAE-1953F412C126}" type="datetimeFigureOut">
               <a:rPr lang="en-US" dirty="0"/>
-              <a:t>6/2/2023</a:t>
+              <a:t>6/4/2023</a:t>
             </a:fld>
             <a:endParaRPr lang="en-US" dirty="0"/>
           </a:p>
@@ -6798,7 +6799,7 @@
           <a:p>
             <a:fld id="{48A87A34-81AB-432B-8DAE-1953F412C126}" type="datetimeFigureOut">
               <a:rPr lang="en-US" dirty="0"/>
-              <a:t>6/2/2023</a:t>
+              <a:t>6/4/2023</a:t>
             </a:fld>
             <a:endParaRPr lang="en-US" dirty="0"/>
           </a:p>
@@ -6963,7 +6964,7 @@
           <a:p>
             <a:fld id="{48A87A34-81AB-432B-8DAE-1953F412C126}" type="datetimeFigureOut">
               <a:rPr lang="en-US" dirty="0"/>
-              <a:t>6/2/2023</a:t>
+              <a:t>6/4/2023</a:t>
             </a:fld>
             <a:endParaRPr lang="en-US" dirty="0"/>
           </a:p>
@@ -7138,7 +7139,7 @@
           <a:p>
             <a:fld id="{48A87A34-81AB-432B-8DAE-1953F412C126}" type="datetimeFigureOut">
               <a:rPr lang="en-US" dirty="0"/>
-              <a:t>6/2/2023</a:t>
+              <a:t>6/4/2023</a:t>
             </a:fld>
             <a:endParaRPr lang="en-US" dirty="0"/>
           </a:p>
@@ -7303,7 +7304,7 @@
           <a:p>
             <a:fld id="{48A87A34-81AB-432B-8DAE-1953F412C126}" type="datetimeFigureOut">
               <a:rPr lang="en-US" dirty="0"/>
-              <a:t>6/2/2023</a:t>
+              <a:t>6/4/2023</a:t>
             </a:fld>
             <a:endParaRPr lang="en-US" dirty="0"/>
           </a:p>
@@ -7548,7 +7549,7 @@
           <a:p>
             <a:fld id="{48A87A34-81AB-432B-8DAE-1953F412C126}" type="datetimeFigureOut">
               <a:rPr lang="en-US" dirty="0"/>
-              <a:t>6/2/2023</a:t>
+              <a:t>6/4/2023</a:t>
             </a:fld>
             <a:endParaRPr lang="en-US" dirty="0"/>
           </a:p>
@@ -7775,7 +7776,7 @@
           <a:p>
             <a:fld id="{48A87A34-81AB-432B-8DAE-1953F412C126}" type="datetimeFigureOut">
               <a:rPr lang="en-US" dirty="0"/>
-              <a:t>6/2/2023</a:t>
+              <a:t>6/4/2023</a:t>
             </a:fld>
             <a:endParaRPr lang="en-US" dirty="0"/>
           </a:p>
@@ -8151,7 +8152,7 @@
           <a:p>
             <a:fld id="{48A87A34-81AB-432B-8DAE-1953F412C126}" type="datetimeFigureOut">
               <a:rPr lang="en-US" dirty="0"/>
-              <a:t>6/2/2023</a:t>
+              <a:t>6/4/2023</a:t>
             </a:fld>
             <a:endParaRPr lang="en-US" dirty="0"/>
           </a:p>
@@ -8264,7 +8265,7 @@
           <a:p>
             <a:fld id="{48A87A34-81AB-432B-8DAE-1953F412C126}" type="datetimeFigureOut">
               <a:rPr lang="en-US" dirty="0"/>
-              <a:t>6/2/2023</a:t>
+              <a:t>6/4/2023</a:t>
             </a:fld>
             <a:endParaRPr lang="en-US" dirty="0"/>
           </a:p>
@@ -8354,7 +8355,7 @@
           <a:p>
             <a:fld id="{48A87A34-81AB-432B-8DAE-1953F412C126}" type="datetimeFigureOut">
               <a:rPr lang="en-US" dirty="0"/>
-              <a:t>6/2/2023</a:t>
+              <a:t>6/4/2023</a:t>
             </a:fld>
             <a:endParaRPr lang="en-US" dirty="0"/>
           </a:p>
@@ -8598,7 +8599,7 @@
           <a:p>
             <a:fld id="{48A87A34-81AB-432B-8DAE-1953F412C126}" type="datetimeFigureOut">
               <a:rPr lang="en-US" dirty="0"/>
-              <a:t>6/2/2023</a:t>
+              <a:t>6/4/2023</a:t>
             </a:fld>
             <a:endParaRPr lang="en-US" dirty="0"/>
           </a:p>
@@ -8873,7 +8874,7 @@
           <a:p>
             <a:fld id="{48A87A34-81AB-432B-8DAE-1953F412C126}" type="datetimeFigureOut">
               <a:rPr lang="en-US" dirty="0"/>
-              <a:t>6/2/2023</a:t>
+              <a:t>6/4/2023</a:t>
             </a:fld>
             <a:endParaRPr lang="en-US" dirty="0"/>
           </a:p>
@@ -8991,7 +8992,7 @@
           <a:noFill/>
           <a:extLst>
             <a:ext uri="{909E8E84-426E-40dd-AFC4-6F175D3DCCD1}">
-              <a14:hiddenFill xmlns:a14="http://schemas.microsoft.com/office/drawing/2010/main" xmlns="">
+              <a14:hiddenFill xmlns="" xmlns:a14="http://schemas.microsoft.com/office/drawing/2010/main">
                 <a:solidFill>
                   <a:srgbClr val="FFFFFF"/>
                 </a:solidFill>
@@ -9065,7 +9066,7 @@
               </a:ln>
               <a:extLst>
                 <a:ext uri="{91240B29-F687-4f45-9708-019B960494DF}">
-                  <a14:hiddenLine xmlns:a14="http://schemas.microsoft.com/office/drawing/2010/main" xmlns="" w="9525">
+                  <a14:hiddenLine xmlns="" xmlns:a14="http://schemas.microsoft.com/office/drawing/2010/main" w="9525">
                     <a:solidFill>
                       <a:srgbClr val="000000"/>
                     </a:solidFill>
@@ -9155,7 +9156,7 @@
               </a:ln>
               <a:extLst>
                 <a:ext uri="{91240B29-F687-4f45-9708-019B960494DF}">
-                  <a14:hiddenLine xmlns:a14="http://schemas.microsoft.com/office/drawing/2010/main" xmlns="" w="9525">
+                  <a14:hiddenLine xmlns="" xmlns:a14="http://schemas.microsoft.com/office/drawing/2010/main" w="9525">
                     <a:solidFill>
                       <a:srgbClr val="000000"/>
                     </a:solidFill>
@@ -9245,7 +9246,7 @@
               </a:ln>
               <a:extLst>
                 <a:ext uri="{91240B29-F687-4f45-9708-019B960494DF}">
-                  <a14:hiddenLine xmlns:a14="http://schemas.microsoft.com/office/drawing/2010/main" xmlns="" w="9525">
+                  <a14:hiddenLine xmlns="" xmlns:a14="http://schemas.microsoft.com/office/drawing/2010/main" w="9525">
                     <a:solidFill>
                       <a:srgbClr val="000000"/>
                     </a:solidFill>
@@ -9307,7 +9308,7 @@
               </a:ln>
               <a:extLst>
                 <a:ext uri="{91240B29-F687-4f45-9708-019B960494DF}">
-                  <a14:hiddenLine xmlns:a14="http://schemas.microsoft.com/office/drawing/2010/main" xmlns="" w="9525">
+                  <a14:hiddenLine xmlns="" xmlns:a14="http://schemas.microsoft.com/office/drawing/2010/main" w="9525">
                     <a:solidFill>
                       <a:srgbClr val="000000"/>
                     </a:solidFill>
@@ -9397,7 +9398,7 @@
               </a:ln>
               <a:extLst>
                 <a:ext uri="{91240B29-F687-4f45-9708-019B960494DF}">
-                  <a14:hiddenLine xmlns:a14="http://schemas.microsoft.com/office/drawing/2010/main" xmlns="" w="9525">
+                  <a14:hiddenLine xmlns="" xmlns:a14="http://schemas.microsoft.com/office/drawing/2010/main" w="9525">
                     <a:solidFill>
                       <a:srgbClr val="000000"/>
                     </a:solidFill>
@@ -9459,7 +9460,7 @@
               </a:ln>
               <a:extLst>
                 <a:ext uri="{91240B29-F687-4f45-9708-019B960494DF}">
-                  <a14:hiddenLine xmlns:a14="http://schemas.microsoft.com/office/drawing/2010/main" xmlns="" w="9525">
+                  <a14:hiddenLine xmlns="" xmlns:a14="http://schemas.microsoft.com/office/drawing/2010/main" w="9525">
                     <a:solidFill>
                       <a:srgbClr val="000000"/>
                     </a:solidFill>
@@ -9521,7 +9522,7 @@
               </a:ln>
               <a:extLst>
                 <a:ext uri="{91240B29-F687-4f45-9708-019B960494DF}">
-                  <a14:hiddenLine xmlns:a14="http://schemas.microsoft.com/office/drawing/2010/main" xmlns="" w="9525">
+                  <a14:hiddenLine xmlns="" xmlns:a14="http://schemas.microsoft.com/office/drawing/2010/main" w="9525">
                     <a:solidFill>
                       <a:srgbClr val="000000"/>
                     </a:solidFill>
@@ -9611,7 +9612,7 @@
               </a:ln>
               <a:extLst>
                 <a:ext uri="{91240B29-F687-4f45-9708-019B960494DF}">
-                  <a14:hiddenLine xmlns:a14="http://schemas.microsoft.com/office/drawing/2010/main" xmlns="" w="9525">
+                  <a14:hiddenLine xmlns="" xmlns:a14="http://schemas.microsoft.com/office/drawing/2010/main" w="9525">
                     <a:solidFill>
                       <a:srgbClr val="000000"/>
                     </a:solidFill>
@@ -9701,7 +9702,7 @@
               </a:ln>
               <a:extLst>
                 <a:ext uri="{91240B29-F687-4f45-9708-019B960494DF}">
-                  <a14:hiddenLine xmlns:a14="http://schemas.microsoft.com/office/drawing/2010/main" xmlns="" w="9525">
+                  <a14:hiddenLine xmlns="" xmlns:a14="http://schemas.microsoft.com/office/drawing/2010/main" w="9525">
                     <a:solidFill>
                       <a:srgbClr val="000000"/>
                     </a:solidFill>
@@ -9763,7 +9764,7 @@
               </a:ln>
               <a:extLst>
                 <a:ext uri="{91240B29-F687-4f45-9708-019B960494DF}">
-                  <a14:hiddenLine xmlns:a14="http://schemas.microsoft.com/office/drawing/2010/main" xmlns="" w="9525">
+                  <a14:hiddenLine xmlns="" xmlns:a14="http://schemas.microsoft.com/office/drawing/2010/main" w="9525">
                     <a:solidFill>
                       <a:srgbClr val="000000"/>
                     </a:solidFill>
@@ -9873,7 +9874,7 @@
               </a:ln>
               <a:extLst>
                 <a:ext uri="{91240B29-F687-4f45-9708-019B960494DF}">
-                  <a14:hiddenLine xmlns:a14="http://schemas.microsoft.com/office/drawing/2010/main" xmlns="" w="9525">
+                  <a14:hiddenLine xmlns="" xmlns:a14="http://schemas.microsoft.com/office/drawing/2010/main" w="9525">
                     <a:solidFill>
                       <a:srgbClr val="000000"/>
                     </a:solidFill>
@@ -9957,7 +9958,7 @@
               </a:ln>
               <a:extLst>
                 <a:ext uri="{91240B29-F687-4f45-9708-019B960494DF}">
-                  <a14:hiddenLine xmlns:a14="http://schemas.microsoft.com/office/drawing/2010/main" xmlns="" w="9525">
+                  <a14:hiddenLine xmlns="" xmlns:a14="http://schemas.microsoft.com/office/drawing/2010/main" w="9525">
                     <a:solidFill>
                       <a:srgbClr val="000000"/>
                     </a:solidFill>
@@ -10019,7 +10020,7 @@
               </a:ln>
               <a:extLst>
                 <a:ext uri="{91240B29-F687-4f45-9708-019B960494DF}">
-                  <a14:hiddenLine xmlns:a14="http://schemas.microsoft.com/office/drawing/2010/main" xmlns="" w="9525">
+                  <a14:hiddenLine xmlns="" xmlns:a14="http://schemas.microsoft.com/office/drawing/2010/main" w="9525">
                     <a:solidFill>
                       <a:srgbClr val="000000"/>
                     </a:solidFill>
@@ -10081,7 +10082,7 @@
               </a:ln>
               <a:extLst>
                 <a:ext uri="{91240B29-F687-4f45-9708-019B960494DF}">
-                  <a14:hiddenLine xmlns:a14="http://schemas.microsoft.com/office/drawing/2010/main" xmlns="" w="9525">
+                  <a14:hiddenLine xmlns="" xmlns:a14="http://schemas.microsoft.com/office/drawing/2010/main" w="9525">
                     <a:solidFill>
                       <a:srgbClr val="000000"/>
                     </a:solidFill>
@@ -10171,7 +10172,7 @@
               </a:ln>
               <a:extLst>
                 <a:ext uri="{91240B29-F687-4f45-9708-019B960494DF}">
-                  <a14:hiddenLine xmlns:a14="http://schemas.microsoft.com/office/drawing/2010/main" xmlns="" w="9525">
+                  <a14:hiddenLine xmlns="" xmlns:a14="http://schemas.microsoft.com/office/drawing/2010/main" w="9525">
                     <a:solidFill>
                       <a:srgbClr val="000000"/>
                     </a:solidFill>
@@ -10205,7 +10206,7 @@
               </a:ln>
               <a:extLst>
                 <a:ext uri="{91240B29-F687-4f45-9708-019B960494DF}">
-                  <a14:hiddenLine xmlns:a14="http://schemas.microsoft.com/office/drawing/2010/main" xmlns="" w="9525">
+                  <a14:hiddenLine xmlns="" xmlns:a14="http://schemas.microsoft.com/office/drawing/2010/main" w="9525">
                     <a:solidFill>
                       <a:srgbClr val="000000"/>
                     </a:solidFill>
@@ -10270,7 +10271,7 @@
               </a:ln>
               <a:extLst>
                 <a:ext uri="{91240B29-F687-4f45-9708-019B960494DF}">
-                  <a14:hiddenLine xmlns:a14="http://schemas.microsoft.com/office/drawing/2010/main" xmlns="" w="9525">
+                  <a14:hiddenLine xmlns="" xmlns:a14="http://schemas.microsoft.com/office/drawing/2010/main" w="9525">
                     <a:solidFill>
                       <a:srgbClr val="000000"/>
                     </a:solidFill>
@@ -10360,7 +10361,7 @@
               </a:ln>
               <a:extLst>
                 <a:ext uri="{91240B29-F687-4f45-9708-019B960494DF}">
-                  <a14:hiddenLine xmlns:a14="http://schemas.microsoft.com/office/drawing/2010/main" xmlns="" w="9525">
+                  <a14:hiddenLine xmlns="" xmlns:a14="http://schemas.microsoft.com/office/drawing/2010/main" w="9525">
                     <a:solidFill>
                       <a:srgbClr val="000000"/>
                     </a:solidFill>
@@ -10422,7 +10423,7 @@
               </a:ln>
               <a:extLst>
                 <a:ext uri="{91240B29-F687-4f45-9708-019B960494DF}">
-                  <a14:hiddenLine xmlns:a14="http://schemas.microsoft.com/office/drawing/2010/main" xmlns="" w="9525">
+                  <a14:hiddenLine xmlns="" xmlns:a14="http://schemas.microsoft.com/office/drawing/2010/main" w="9525">
                     <a:solidFill>
                       <a:srgbClr val="000000"/>
                     </a:solidFill>
@@ -10512,7 +10513,7 @@
               </a:ln>
               <a:extLst>
                 <a:ext uri="{91240B29-F687-4f45-9708-019B960494DF}">
-                  <a14:hiddenLine xmlns:a14="http://schemas.microsoft.com/office/drawing/2010/main" xmlns="" w="9525">
+                  <a14:hiddenLine xmlns="" xmlns:a14="http://schemas.microsoft.com/office/drawing/2010/main" w="9525">
                     <a:solidFill>
                       <a:srgbClr val="000000"/>
                     </a:solidFill>
@@ -10577,7 +10578,7 @@
               </a:ln>
               <a:extLst>
                 <a:ext uri="{91240B29-F687-4f45-9708-019B960494DF}">
-                  <a14:hiddenLine xmlns:a14="http://schemas.microsoft.com/office/drawing/2010/main" xmlns="" w="9525">
+                  <a14:hiddenLine xmlns="" xmlns:a14="http://schemas.microsoft.com/office/drawing/2010/main" w="9525">
                     <a:solidFill>
                       <a:srgbClr val="000000"/>
                     </a:solidFill>
@@ -10639,7 +10640,7 @@
               </a:ln>
               <a:extLst>
                 <a:ext uri="{91240B29-F687-4f45-9708-019B960494DF}">
-                  <a14:hiddenLine xmlns:a14="http://schemas.microsoft.com/office/drawing/2010/main" xmlns="" w="9525">
+                  <a14:hiddenLine xmlns="" xmlns:a14="http://schemas.microsoft.com/office/drawing/2010/main" w="9525">
                     <a:solidFill>
                       <a:srgbClr val="000000"/>
                     </a:solidFill>
@@ -10729,7 +10730,7 @@
               </a:ln>
               <a:extLst>
                 <a:ext uri="{91240B29-F687-4f45-9708-019B960494DF}">
-                  <a14:hiddenLine xmlns:a14="http://schemas.microsoft.com/office/drawing/2010/main" xmlns="" w="9525">
+                  <a14:hiddenLine xmlns="" xmlns:a14="http://schemas.microsoft.com/office/drawing/2010/main" w="9525">
                     <a:solidFill>
                       <a:srgbClr val="000000"/>
                     </a:solidFill>
@@ -10819,7 +10820,7 @@
               </a:ln>
               <a:extLst>
                 <a:ext uri="{91240B29-F687-4f45-9708-019B960494DF}">
-                  <a14:hiddenLine xmlns:a14="http://schemas.microsoft.com/office/drawing/2010/main" xmlns="" w="9525">
+                  <a14:hiddenLine xmlns="" xmlns:a14="http://schemas.microsoft.com/office/drawing/2010/main" w="9525">
                     <a:solidFill>
                       <a:srgbClr val="000000"/>
                     </a:solidFill>
@@ -10884,7 +10885,7 @@
               </a:ln>
               <a:extLst>
                 <a:ext uri="{91240B29-F687-4f45-9708-019B960494DF}">
-                  <a14:hiddenLine xmlns:a14="http://schemas.microsoft.com/office/drawing/2010/main" xmlns="" w="9525">
+                  <a14:hiddenLine xmlns="" xmlns:a14="http://schemas.microsoft.com/office/drawing/2010/main" w="9525">
                     <a:solidFill>
                       <a:srgbClr val="000000"/>
                     </a:solidFill>
@@ -11004,7 +11005,7 @@
               </a:ln>
               <a:extLst>
                 <a:ext uri="{91240B29-F687-4f45-9708-019B960494DF}">
-                  <a14:hiddenLine xmlns:a14="http://schemas.microsoft.com/office/drawing/2010/main" xmlns="" w="9525">
+                  <a14:hiddenLine xmlns="" xmlns:a14="http://schemas.microsoft.com/office/drawing/2010/main" w="9525">
                     <a:solidFill>
                       <a:srgbClr val="000000"/>
                     </a:solidFill>
@@ -11085,7 +11086,7 @@
               </a:ln>
               <a:extLst>
                 <a:ext uri="{91240B29-F687-4f45-9708-019B960494DF}">
-                  <a14:hiddenLine xmlns:a14="http://schemas.microsoft.com/office/drawing/2010/main" xmlns="" w="9525">
+                  <a14:hiddenLine xmlns="" xmlns:a14="http://schemas.microsoft.com/office/drawing/2010/main" w="9525">
                     <a:solidFill>
                       <a:srgbClr val="000000"/>
                     </a:solidFill>
@@ -11200,7 +11201,7 @@
               </a:ln>
               <a:extLst>
                 <a:ext uri="{91240B29-F687-4f45-9708-019B960494DF}">
-                  <a14:hiddenLine xmlns:a14="http://schemas.microsoft.com/office/drawing/2010/main" xmlns="" w="9525">
+                  <a14:hiddenLine xmlns="" xmlns:a14="http://schemas.microsoft.com/office/drawing/2010/main" w="9525">
                     <a:solidFill>
                       <a:srgbClr val="000000"/>
                     </a:solidFill>
@@ -11290,7 +11291,7 @@
               </a:ln>
               <a:extLst>
                 <a:ext uri="{91240B29-F687-4f45-9708-019B960494DF}">
-                  <a14:hiddenLine xmlns:a14="http://schemas.microsoft.com/office/drawing/2010/main" xmlns="" w="9525">
+                  <a14:hiddenLine xmlns="" xmlns:a14="http://schemas.microsoft.com/office/drawing/2010/main" w="9525">
                     <a:solidFill>
                       <a:srgbClr val="000000"/>
                     </a:solidFill>
@@ -11355,7 +11356,7 @@
               </a:ln>
               <a:extLst>
                 <a:ext uri="{91240B29-F687-4f45-9708-019B960494DF}">
-                  <a14:hiddenLine xmlns:a14="http://schemas.microsoft.com/office/drawing/2010/main" xmlns="" w="9525">
+                  <a14:hiddenLine xmlns="" xmlns:a14="http://schemas.microsoft.com/office/drawing/2010/main" w="9525">
                     <a:solidFill>
                       <a:srgbClr val="000000"/>
                     </a:solidFill>
@@ -11445,7 +11446,7 @@
               </a:ln>
               <a:extLst>
                 <a:ext uri="{91240B29-F687-4f45-9708-019B960494DF}">
-                  <a14:hiddenLine xmlns:a14="http://schemas.microsoft.com/office/drawing/2010/main" xmlns="" w="9525">
+                  <a14:hiddenLine xmlns="" xmlns:a14="http://schemas.microsoft.com/office/drawing/2010/main" w="9525">
                     <a:solidFill>
                       <a:srgbClr val="000000"/>
                     </a:solidFill>
@@ -11513,7 +11514,7 @@
               </a:ln>
               <a:extLst>
                 <a:ext uri="{91240B29-F687-4f45-9708-019B960494DF}">
-                  <a14:hiddenLine xmlns:a14="http://schemas.microsoft.com/office/drawing/2010/main" xmlns="" w="9525">
+                  <a14:hiddenLine xmlns="" xmlns:a14="http://schemas.microsoft.com/office/drawing/2010/main" w="9525">
                     <a:solidFill>
                       <a:srgbClr val="000000"/>
                     </a:solidFill>
@@ -11603,7 +11604,7 @@
               </a:ln>
               <a:extLst>
                 <a:ext uri="{91240B29-F687-4f45-9708-019B960494DF}">
-                  <a14:hiddenLine xmlns:a14="http://schemas.microsoft.com/office/drawing/2010/main" xmlns="" w="9525">
+                  <a14:hiddenLine xmlns="" xmlns:a14="http://schemas.microsoft.com/office/drawing/2010/main" w="9525">
                     <a:solidFill>
                       <a:srgbClr val="000000"/>
                     </a:solidFill>
@@ -11671,7 +11672,7 @@
               </a:ln>
               <a:extLst>
                 <a:ext uri="{91240B29-F687-4f45-9708-019B960494DF}">
-                  <a14:hiddenLine xmlns:a14="http://schemas.microsoft.com/office/drawing/2010/main" xmlns="" w="9525">
+                  <a14:hiddenLine xmlns="" xmlns:a14="http://schemas.microsoft.com/office/drawing/2010/main" w="9525">
                     <a:solidFill>
                       <a:srgbClr val="000000"/>
                     </a:solidFill>
@@ -11761,7 +11762,7 @@
               </a:ln>
               <a:extLst>
                 <a:ext uri="{91240B29-F687-4f45-9708-019B960494DF}">
-                  <a14:hiddenLine xmlns:a14="http://schemas.microsoft.com/office/drawing/2010/main" xmlns="" w="9525">
+                  <a14:hiddenLine xmlns="" xmlns:a14="http://schemas.microsoft.com/office/drawing/2010/main" w="9525">
                     <a:solidFill>
                       <a:srgbClr val="000000"/>
                     </a:solidFill>
@@ -11795,7 +11796,7 @@
               </a:ln>
               <a:extLst>
                 <a:ext uri="{91240B29-F687-4f45-9708-019B960494DF}">
-                  <a14:hiddenLine xmlns:a14="http://schemas.microsoft.com/office/drawing/2010/main" xmlns="" w="9525">
+                  <a14:hiddenLine xmlns="" xmlns:a14="http://schemas.microsoft.com/office/drawing/2010/main" w="9525">
                     <a:solidFill>
                       <a:srgbClr val="000000"/>
                     </a:solidFill>
@@ -11936,7 +11937,7 @@
             <a:fld id="{48A87A34-81AB-432B-8DAE-1953F412C126}" type="datetimeFigureOut">
               <a:rPr lang="en-US" dirty="0"/>
               <a:pPr/>
-              <a:t>6/2/2023</a:t>
+              <a:t>6/4/2023</a:t>
             </a:fld>
             <a:endParaRPr lang="en-US" dirty="0"/>
           </a:p>
@@ -12430,6 +12431,109 @@
 </p:sld>
 </file>
 
+<file path=ppt/slides/slide10.xml><?xml version="1.0" encoding="utf-8"?>
+<p:sld xmlns:a="http://schemas.openxmlformats.org/drawingml/2006/main" xmlns:r="http://schemas.openxmlformats.org/officeDocument/2006/relationships" xmlns:p="http://schemas.openxmlformats.org/presentationml/2006/main">
+  <p:cSld>
+    <p:spTree>
+      <p:nvGrpSpPr>
+        <p:cNvPr id="1" name=""/>
+        <p:cNvGrpSpPr/>
+        <p:nvPr/>
+      </p:nvGrpSpPr>
+      <p:grpSpPr>
+        <a:xfrm>
+          <a:off x="0" y="0"/>
+          <a:ext cx="0" cy="0"/>
+          <a:chOff x="0" y="0"/>
+          <a:chExt cx="0" cy="0"/>
+        </a:xfrm>
+      </p:grpSpPr>
+      <p:sp>
+        <p:nvSpPr>
+          <p:cNvPr id="2" name="Título 1">
+            <a:extLst>
+              <a:ext uri="{FF2B5EF4-FFF2-40B4-BE49-F238E27FC236}">
+                <a16:creationId xmlns:a16="http://schemas.microsoft.com/office/drawing/2014/main" id="{F1E8B182-0BB3-17B7-2C60-DA7075DADD60}"/>
+              </a:ext>
+            </a:extLst>
+          </p:cNvPr>
+          <p:cNvSpPr>
+            <a:spLocks noGrp="1"/>
+          </p:cNvSpPr>
+          <p:nvPr>
+            <p:ph type="title"/>
+          </p:nvPr>
+        </p:nvSpPr>
+        <p:spPr/>
+        <p:txBody>
+          <a:bodyPr/>
+          <a:lstStyle/>
+          <a:p>
+            <a:r>
+              <a:rPr lang="en-GB" dirty="0"/>
+              <a:t>problems</a:t>
+            </a:r>
+          </a:p>
+        </p:txBody>
+      </p:sp>
+      <p:sp>
+        <p:nvSpPr>
+          <p:cNvPr id="3" name="Marcador de Posição de Conteúdo 2">
+            <a:extLst>
+              <a:ext uri="{FF2B5EF4-FFF2-40B4-BE49-F238E27FC236}">
+                <a16:creationId xmlns:a16="http://schemas.microsoft.com/office/drawing/2014/main" id="{0D22CAE7-D1EC-8634-F7BA-768ED729BEDF}"/>
+              </a:ext>
+            </a:extLst>
+          </p:cNvPr>
+          <p:cNvSpPr>
+            <a:spLocks noGrp="1"/>
+          </p:cNvSpPr>
+          <p:nvPr>
+            <p:ph idx="1"/>
+          </p:nvPr>
+        </p:nvSpPr>
+        <p:spPr>
+          <a:xfrm>
+            <a:off x="1141412" y="2097088"/>
+            <a:ext cx="9905999" cy="3541714"/>
+          </a:xfrm>
+        </p:spPr>
+        <p:txBody>
+          <a:bodyPr>
+            <a:normAutofit/>
+          </a:bodyPr>
+          <a:lstStyle/>
+          <a:p>
+            <a:r>
+              <a:rPr lang="en-GB" sz="2800" dirty="0"/>
+              <a:t>Graph:</a:t>
+            </a:r>
+          </a:p>
+          <a:p>
+            <a:pPr lvl="2"/>
+            <a:r>
+              <a:rPr lang="en-GB" sz="2000" dirty="0"/>
+              <a:t>The distance values obtained through our algorithms vary and sometimes are quite ridiculous and outright wrong</a:t>
+            </a:r>
+          </a:p>
+        </p:txBody>
+      </p:sp>
+    </p:spTree>
+    <p:extLst>
+      <p:ext uri="{BB962C8B-B14F-4D97-AF65-F5344CB8AC3E}">
+        <p14:creationId xmlns:p14="http://schemas.microsoft.com/office/powerpoint/2010/main" val="3542938484"/>
+      </p:ext>
+    </p:extLst>
+  </p:cSld>
+  <p:clrMapOvr>
+    <a:masterClrMapping/>
+  </p:clrMapOvr>
+  <p:transition spd="slow">
+    <p:push dir="u"/>
+  </p:transition>
+</p:sld>
+</file>
+
 <file path=ppt/slides/slide2.xml><?xml version="1.0" encoding="utf-8"?>
 <p:sld xmlns:a="http://schemas.openxmlformats.org/drawingml/2006/main" xmlns:r="http://schemas.openxmlformats.org/officeDocument/2006/relationships" xmlns:p="http://schemas.openxmlformats.org/presentationml/2006/main">
   <p:cSld>
@@ -12832,13 +12936,13 @@
           <a:lstStyle/>
           <a:p>
             <a:r>
-              <a:rPr lang="en-US" sz="2000" dirty="0" err="1">
+              <a:rPr lang="en-US" dirty="0" err="1">
                 <a:effectLst/>
               </a:rPr>
               <a:t>Menu.h</a:t>
             </a:r>
             <a:r>
-              <a:rPr lang="en-US" sz="2000" dirty="0">
+              <a:rPr lang="en-US" dirty="0">
                 <a:effectLst/>
               </a:rPr>
               <a:t>: </a:t>
@@ -12846,16 +12950,16 @@
           </a:p>
           <a:p>
             <a:r>
-              <a:rPr lang="en-US" sz="1600" dirty="0"/>
+              <a:rPr lang="en-US" sz="1800" dirty="0"/>
               <a:t>Menus:</a:t>
             </a:r>
-            <a:endParaRPr lang="en-US" sz="1600" dirty="0">
+            <a:endParaRPr lang="en-US" sz="1800" dirty="0">
               <a:effectLst/>
             </a:endParaRPr>
           </a:p>
           <a:p>
             <a:r>
-              <a:rPr lang="en-US" sz="1600" dirty="0" err="1">
+              <a:rPr lang="en-US" sz="1800" dirty="0" err="1">
                 <a:solidFill>
                   <a:srgbClr val="FFC66D"/>
                 </a:solidFill>
@@ -12865,7 +12969,7 @@
               <a:t>SelectGraphMenu</a:t>
             </a:r>
             <a:r>
-              <a:rPr lang="en-US" sz="1600" dirty="0">
+              <a:rPr lang="en-US" sz="1800" dirty="0">
                 <a:solidFill>
                   <a:srgbClr val="FFC66D"/>
                 </a:solidFill>
@@ -12875,19 +12979,19 @@
               <a:t> </a:t>
             </a:r>
             <a:r>
-              <a:rPr lang="en-US" sz="1600" dirty="0">
+              <a:rPr lang="en-US" sz="1800" dirty="0">
                 <a:effectLst/>
                 <a:latin typeface="JetBrains Mono"/>
               </a:rPr>
               <a:t>– First menu to appear where the user selects the graph desired</a:t>
             </a:r>
-            <a:endParaRPr lang="en-US" sz="1600" dirty="0">
+            <a:endParaRPr lang="en-US" sz="1800" dirty="0">
               <a:latin typeface="JetBrains Mono"/>
             </a:endParaRPr>
           </a:p>
           <a:p>
             <a:r>
-              <a:rPr lang="en-US" sz="1600" dirty="0" err="1">
+              <a:rPr lang="en-US" sz="1800" dirty="0" err="1">
                 <a:solidFill>
                   <a:srgbClr val="FFC66D"/>
                 </a:solidFill>
@@ -12897,7 +13001,7 @@
               <a:t>MainMenu</a:t>
             </a:r>
             <a:r>
-              <a:rPr lang="en-US" sz="1600" dirty="0">
+              <a:rPr lang="en-US" sz="1800" dirty="0">
                 <a:solidFill>
                   <a:srgbClr val="FFC66D"/>
                 </a:solidFill>
@@ -12907,14 +13011,14 @@
               <a:t> </a:t>
             </a:r>
             <a:r>
-              <a:rPr lang="en-US" sz="1600" dirty="0">
+              <a:rPr lang="en-US" sz="1800" dirty="0">
                 <a:effectLst/>
                 <a:latin typeface="JetBrains Mono"/>
               </a:rPr>
               <a:t>– Main menu </a:t>
             </a:r>
             <a:r>
-              <a:rPr lang="en-US" sz="1600" dirty="0">
+              <a:rPr lang="en-US" sz="1800" dirty="0">
                 <a:latin typeface="JetBrains Mono"/>
               </a:rPr>
               <a:t>where user can select the main functionalities implemented</a:t>
@@ -12922,7 +13026,7 @@
           </a:p>
           <a:p>
             <a:r>
-              <a:rPr lang="en-US" sz="1600" dirty="0" err="1">
+              <a:rPr lang="en-US" sz="1800" dirty="0" err="1">
                 <a:solidFill>
                   <a:srgbClr val="FFC66D"/>
                 </a:solidFill>
@@ -12932,7 +13036,7 @@
               <a:t>InfoMenu</a:t>
             </a:r>
             <a:r>
-              <a:rPr lang="en-US" sz="1600" dirty="0">
+              <a:rPr lang="en-US" sz="1800" dirty="0">
                 <a:solidFill>
                   <a:srgbClr val="FFC66D"/>
                 </a:solidFill>
@@ -12942,7 +13046,7 @@
               <a:t> </a:t>
             </a:r>
             <a:r>
-              <a:rPr lang="en-US" sz="1600" dirty="0">
+              <a:rPr lang="en-US" sz="1800" dirty="0">
                 <a:effectLst/>
                 <a:latin typeface="JetBrains Mono"/>
               </a:rPr>
@@ -12951,7 +13055,7 @@
           </a:p>
           <a:p>
             <a:r>
-              <a:rPr kumimoji="0" lang="en-US" altLang="pt-PT" sz="1600" b="0" i="0" u="none" strike="noStrike" cap="none" normalizeH="0" baseline="0" dirty="0">
+              <a:rPr kumimoji="0" lang="en-US" altLang="pt-PT" sz="1800" b="0" i="0" u="none" strike="noStrike" cap="none" normalizeH="0" baseline="0" dirty="0">
                 <a:ln>
                   <a:noFill/>
                 </a:ln>
@@ -12965,7 +13069,7 @@
           </a:p>
           <a:p>
             <a:r>
-              <a:rPr lang="en-US" sz="1600" dirty="0" err="1">
+              <a:rPr lang="en-US" sz="1800" dirty="0" err="1">
                 <a:solidFill>
                   <a:srgbClr val="FFC66D"/>
                 </a:solidFill>
@@ -12975,7 +13079,7 @@
               <a:t>printTitle</a:t>
             </a:r>
             <a:r>
-              <a:rPr lang="en-US" sz="1600" dirty="0">
+              <a:rPr lang="en-US" sz="1800" dirty="0">
                 <a:solidFill>
                   <a:srgbClr val="A9B7C6"/>
                 </a:solidFill>
@@ -12984,7 +13088,7 @@
               <a:t> </a:t>
             </a:r>
             <a:r>
-              <a:rPr lang="en-US" sz="1600" dirty="0">
+              <a:rPr lang="en-US" sz="1800" dirty="0">
                 <a:latin typeface="JetBrains Mono"/>
               </a:rPr>
               <a:t>– Function that prints this project’s title</a:t>
@@ -12992,7 +13096,7 @@
           </a:p>
           <a:p>
             <a:r>
-              <a:rPr lang="en-US" sz="1600" dirty="0" err="1">
+              <a:rPr lang="en-US" sz="1800" dirty="0" err="1">
                 <a:solidFill>
                   <a:srgbClr val="FFC66D"/>
                 </a:solidFill>
@@ -13002,7 +13106,7 @@
               <a:t>getUserInput</a:t>
             </a:r>
             <a:r>
-              <a:rPr lang="en-US" sz="1600" dirty="0">
+              <a:rPr lang="en-US" sz="1800" dirty="0">
                 <a:solidFill>
                   <a:srgbClr val="FFC66D"/>
                 </a:solidFill>
@@ -13012,19 +13116,19 @@
               <a:t> </a:t>
             </a:r>
             <a:r>
-              <a:rPr lang="en-US" sz="1600" dirty="0">
+              <a:rPr lang="en-US" sz="1800" dirty="0">
                 <a:effectLst/>
                 <a:latin typeface="JetBrains Mono"/>
               </a:rPr>
               <a:t>– Function that receives the user’s input</a:t>
             </a:r>
-            <a:endParaRPr lang="en-US" sz="1600" dirty="0">
+            <a:endParaRPr lang="en-US" sz="1800" dirty="0">
               <a:latin typeface="JetBrains Mono"/>
             </a:endParaRPr>
           </a:p>
           <a:p>
             <a:r>
-              <a:rPr lang="en-US" sz="1600" dirty="0" err="1">
+              <a:rPr lang="en-US" sz="1800" dirty="0" err="1">
                 <a:solidFill>
                   <a:srgbClr val="FFC66D"/>
                 </a:solidFill>
@@ -13034,7 +13138,7 @@
               <a:t>clearScreen</a:t>
             </a:r>
             <a:r>
-              <a:rPr lang="en-US" sz="1600" dirty="0">
+              <a:rPr lang="en-US" sz="1800" dirty="0">
                 <a:solidFill>
                   <a:srgbClr val="FFC66D"/>
                 </a:solidFill>
@@ -13044,26 +13148,26 @@
               <a:t> </a:t>
             </a:r>
             <a:r>
-              <a:rPr lang="en-US" sz="1600" dirty="0">
+              <a:rPr lang="en-US" sz="1800" dirty="0">
                 <a:effectLst/>
                 <a:latin typeface="JetBrains Mono"/>
               </a:rPr>
               <a:t>– </a:t>
             </a:r>
             <a:r>
-              <a:rPr lang="en-US" sz="1600" dirty="0">
+              <a:rPr lang="en-US" sz="1800" dirty="0">
                 <a:latin typeface="JetBrains Mono"/>
               </a:rPr>
               <a:t> Function that clears the terminal</a:t>
             </a:r>
-            <a:endParaRPr lang="en-US" sz="1600" dirty="0">
+            <a:endParaRPr lang="en-US" sz="1800" dirty="0">
               <a:effectLst/>
               <a:latin typeface="JetBrains Mono"/>
             </a:endParaRPr>
           </a:p>
           <a:p>
             <a:r>
-              <a:rPr lang="en-US" sz="1600">
+              <a:rPr lang="en-US" sz="1800" dirty="0">
                 <a:solidFill>
                   <a:srgbClr val="FFC66D"/>
                 </a:solidFill>
@@ -13073,27 +13177,13 @@
               <a:t>print </a:t>
             </a:r>
             <a:r>
-              <a:rPr lang="en-US" sz="1600">
+              <a:rPr lang="en-US" sz="1800" dirty="0">
                 <a:effectLst/>
                 <a:latin typeface="JetBrains Mono"/>
               </a:rPr>
-              <a:t>– </a:t>
-            </a:r>
-            <a:r>
-              <a:rPr lang="en-US" sz="1600" dirty="0">
-                <a:effectLst/>
-                <a:latin typeface="JetBrains Mono"/>
-              </a:rPr>
-              <a:t>Functions used to print </a:t>
-            </a:r>
-            <a:r>
-              <a:rPr lang="en-US" sz="1600">
-                <a:effectLst/>
-                <a:latin typeface="JetBrains Mono"/>
-              </a:rPr>
-              <a:t>certain data as a table or as a path</a:t>
-            </a:r>
-            <a:endParaRPr kumimoji="0" lang="pt-PT" altLang="pt-PT" sz="2000" b="0" i="0" u="none" strike="noStrike" cap="none" normalizeH="0" baseline="0" dirty="0">
+              <a:t>– Functions used to print certain data as a table or as a path</a:t>
+            </a:r>
+            <a:endParaRPr kumimoji="0" lang="pt-PT" altLang="pt-PT" b="0" i="0" u="none" strike="noStrike" cap="none" normalizeH="0" baseline="0" dirty="0">
               <a:ln>
                 <a:noFill/>
               </a:ln>
@@ -13226,7 +13316,7 @@
               <a:defRPr/>
             </a:pPr>
             <a:r>
-              <a:rPr kumimoji="0" lang="en-GB" sz="2000" b="0" i="0" u="none" strike="noStrike" kern="1200" cap="none" spc="0" normalizeH="0" baseline="0" noProof="0" dirty="0" err="1">
+              <a:rPr kumimoji="0" lang="en-GB" b="0" i="0" u="none" strike="noStrike" kern="1200" cap="none" spc="0" normalizeH="0" baseline="0" noProof="0" dirty="0" err="1">
                 <a:ln>
                   <a:noFill/>
                 </a:ln>
@@ -13243,7 +13333,7 @@
               <a:t>Data.h</a:t>
             </a:r>
             <a:r>
-              <a:rPr kumimoji="0" lang="en-GB" sz="2000" b="0" i="0" u="none" strike="noStrike" kern="1200" cap="none" spc="0" normalizeH="0" baseline="0" noProof="0" dirty="0">
+              <a:rPr kumimoji="0" lang="en-GB" b="0" i="0" u="none" strike="noStrike" kern="1200" cap="none" spc="0" normalizeH="0" baseline="0" noProof="0" dirty="0">
                 <a:ln>
                   <a:noFill/>
                 </a:ln>
@@ -13279,7 +13369,7 @@
               <a:defRPr/>
             </a:pPr>
             <a:r>
-              <a:rPr kumimoji="0" lang="en-GB" sz="1600" b="0" i="0" u="none" strike="noStrike" kern="1200" cap="none" spc="0" normalizeH="0" baseline="0" noProof="0" dirty="0">
+              <a:rPr kumimoji="0" lang="en-GB" sz="1800" b="0" i="0" u="none" strike="noStrike" kern="1200" cap="none" spc="0" normalizeH="0" baseline="0" noProof="0" dirty="0">
                 <a:ln>
                   <a:noFill/>
                 </a:ln>
@@ -13315,7 +13405,7 @@
               <a:defRPr/>
             </a:pPr>
             <a:r>
-              <a:rPr kumimoji="0" lang="en-US" sz="1600" b="0" i="0" u="none" strike="noStrike" kern="1200" cap="none" spc="0" normalizeH="0" baseline="0" noProof="0" dirty="0" err="1">
+              <a:rPr kumimoji="0" lang="en-US" sz="1800" b="0" i="0" u="none" strike="noStrike" kern="1200" cap="none" spc="0" normalizeH="0" baseline="0" noProof="0" dirty="0" err="1">
                 <a:ln>
                   <a:noFill/>
                 </a:ln>
@@ -13332,7 +13422,7 @@
               <a:t>readRealGraphs</a:t>
             </a:r>
             <a:r>
-              <a:rPr kumimoji="0" lang="en-US" sz="1600" b="0" i="0" u="none" strike="noStrike" kern="1200" cap="none" spc="0" normalizeH="0" baseline="0" noProof="0" dirty="0">
+              <a:rPr kumimoji="0" lang="en-US" sz="1800" b="0" i="0" u="none" strike="noStrike" kern="1200" cap="none" spc="0" normalizeH="0" baseline="0" noProof="0" dirty="0">
                 <a:ln>
                   <a:noFill/>
                 </a:ln>
@@ -13349,7 +13439,7 @@
               <a:t> </a:t>
             </a:r>
             <a:r>
-              <a:rPr kumimoji="0" lang="en-US" sz="1600" b="0" i="0" u="none" strike="noStrike" kern="1200" cap="none" spc="0" normalizeH="0" baseline="0" noProof="0" dirty="0">
+              <a:rPr kumimoji="0" lang="en-US" sz="1800" b="0" i="0" u="none" strike="noStrike" kern="1200" cap="none" spc="0" normalizeH="0" baseline="0" noProof="0" dirty="0">
                 <a:ln>
                   <a:noFill/>
                 </a:ln>
@@ -13385,7 +13475,7 @@
               <a:defRPr/>
             </a:pPr>
             <a:r>
-              <a:rPr kumimoji="0" lang="en-US" sz="1600" b="0" i="0" u="none" strike="noStrike" kern="1200" cap="none" spc="0" normalizeH="0" baseline="0" noProof="0" dirty="0" err="1">
+              <a:rPr kumimoji="0" lang="en-US" sz="1800" b="0" i="0" u="none" strike="noStrike" kern="1200" cap="none" spc="0" normalizeH="0" baseline="0" noProof="0" dirty="0" err="1">
                 <a:ln>
                   <a:noFill/>
                 </a:ln>
@@ -13402,7 +13492,7 @@
               <a:t>readToyGraphs</a:t>
             </a:r>
             <a:r>
-              <a:rPr kumimoji="0" lang="en-US" sz="1600" b="0" i="0" u="none" strike="noStrike" kern="1200" cap="none" spc="0" normalizeH="0" baseline="0" noProof="0" dirty="0">
+              <a:rPr kumimoji="0" lang="en-US" sz="1800" b="0" i="0" u="none" strike="noStrike" kern="1200" cap="none" spc="0" normalizeH="0" baseline="0" noProof="0" dirty="0">
                 <a:ln>
                   <a:noFill/>
                 </a:ln>
@@ -13419,7 +13509,7 @@
               <a:t> </a:t>
             </a:r>
             <a:r>
-              <a:rPr kumimoji="0" lang="en-US" sz="1600" b="0" i="0" u="none" strike="noStrike" kern="1200" cap="none" spc="0" normalizeH="0" baseline="0" noProof="0" dirty="0">
+              <a:rPr kumimoji="0" lang="en-US" sz="1800" b="0" i="0" u="none" strike="noStrike" kern="1200" cap="none" spc="0" normalizeH="0" baseline="0" noProof="0" dirty="0">
                 <a:ln>
                   <a:noFill/>
                 </a:ln>
@@ -13455,7 +13545,7 @@
               <a:defRPr/>
             </a:pPr>
             <a:r>
-              <a:rPr kumimoji="0" lang="en-US" sz="1600" b="0" i="0" u="none" strike="noStrike" kern="1200" cap="none" spc="0" normalizeH="0" baseline="0" noProof="0" dirty="0" err="1">
+              <a:rPr kumimoji="0" lang="en-US" sz="1800" b="0" i="0" u="none" strike="noStrike" kern="1200" cap="none" spc="0" normalizeH="0" baseline="0" noProof="0" dirty="0" err="1">
                 <a:ln>
                   <a:noFill/>
                 </a:ln>
@@ -13472,7 +13562,7 @@
               <a:t>readExtraGraphs</a:t>
             </a:r>
             <a:r>
-              <a:rPr kumimoji="0" lang="en-US" sz="1600" b="0" i="0" u="none" strike="noStrike" kern="1200" cap="none" spc="0" normalizeH="0" baseline="0" noProof="0" dirty="0">
+              <a:rPr kumimoji="0" lang="en-US" sz="1800" b="0" i="0" u="none" strike="noStrike" kern="1200" cap="none" spc="0" normalizeH="0" baseline="0" noProof="0" dirty="0">
                 <a:ln>
                   <a:noFill/>
                 </a:ln>
@@ -13489,7 +13579,7 @@
               <a:t> </a:t>
             </a:r>
             <a:r>
-              <a:rPr kumimoji="0" lang="en-US" sz="1600" b="0" i="0" u="none" strike="noStrike" kern="1200" cap="none" spc="0" normalizeH="0" baseline="0" noProof="0" dirty="0">
+              <a:rPr kumimoji="0" lang="en-US" sz="1800" b="0" i="0" u="none" strike="noStrike" kern="1200" cap="none" spc="0" normalizeH="0" baseline="0" noProof="0" dirty="0">
                 <a:ln>
                   <a:noFill/>
                 </a:ln>
@@ -13525,7 +13615,7 @@
               <a:defRPr/>
             </a:pPr>
             <a:r>
-              <a:rPr kumimoji="0" lang="en-US" sz="1600" b="0" i="0" u="none" strike="noStrike" kern="1200" cap="none" spc="0" normalizeH="0" baseline="0" noProof="0" dirty="0">
+              <a:rPr kumimoji="0" lang="en-US" sz="1800" b="0" i="0" u="none" strike="noStrike" kern="1200" cap="none" spc="0" normalizeH="0" baseline="0" noProof="0" dirty="0">
                 <a:ln>
                   <a:noFill/>
                 </a:ln>
@@ -13561,7 +13651,7 @@
               <a:defRPr/>
             </a:pPr>
             <a:r>
-              <a:rPr kumimoji="0" lang="en-US" sz="1600" b="0" i="0" u="none" strike="noStrike" kern="1200" cap="none" spc="0" normalizeH="0" baseline="0" noProof="0" dirty="0" err="1">
+              <a:rPr kumimoji="0" lang="en-US" sz="1800" b="0" i="0" u="none" strike="noStrike" kern="1200" cap="none" spc="0" normalizeH="0" baseline="0" noProof="0" dirty="0" err="1">
                 <a:ln>
                   <a:noFill/>
                 </a:ln>
@@ -13578,7 +13668,7 @@
               <a:t>getGraph</a:t>
             </a:r>
             <a:r>
-              <a:rPr kumimoji="0" lang="en-US" sz="1600" b="0" i="0" u="none" strike="noStrike" kern="1200" cap="none" spc="0" normalizeH="0" baseline="0" noProof="0" dirty="0">
+              <a:rPr kumimoji="0" lang="en-US" sz="1800" b="0" i="0" u="none" strike="noStrike" kern="1200" cap="none" spc="0" normalizeH="0" baseline="0" noProof="0" dirty="0">
                 <a:ln>
                   <a:noFill/>
                 </a:ln>
@@ -13595,7 +13685,7 @@
               <a:t> </a:t>
             </a:r>
             <a:r>
-              <a:rPr kumimoji="0" lang="en-US" sz="1600" b="0" i="0" u="none" strike="noStrike" kern="1200" cap="none" spc="0" normalizeH="0" baseline="0" noProof="0" dirty="0">
+              <a:rPr kumimoji="0" lang="en-US" sz="1800" b="0" i="0" u="none" strike="noStrike" kern="1200" cap="none" spc="0" normalizeH="0" baseline="0" noProof="0" dirty="0">
                 <a:ln>
                   <a:noFill/>
                 </a:ln>
@@ -13612,7 +13702,7 @@
               <a:t>– Returns the Graph </a:t>
             </a:r>
             <a:r>
-              <a:rPr kumimoji="0" lang="en-US" sz="1600" b="0" i="0" u="none" strike="noStrike" kern="1200" cap="none" spc="0" normalizeH="0" baseline="0" noProof="0" dirty="0" err="1">
+              <a:rPr kumimoji="0" lang="en-US" sz="1800" b="0" i="0" u="none" strike="noStrike" kern="1200" cap="none" spc="0" normalizeH="0" baseline="0" noProof="0" dirty="0" err="1">
                 <a:ln>
                   <a:noFill/>
                 </a:ln>
@@ -13628,7 +13718,7 @@
               </a:rPr>
               <a:t>graph</a:t>
             </a:r>
-            <a:endParaRPr kumimoji="0" lang="en-US" sz="1600" b="0" i="0" u="none" strike="noStrike" kern="1200" cap="none" spc="0" normalizeH="0" baseline="0" noProof="0" dirty="0">
+            <a:endParaRPr kumimoji="0" lang="en-US" sz="1800" b="0" i="0" u="none" strike="noStrike" kern="1200" cap="none" spc="0" normalizeH="0" baseline="0" noProof="0" dirty="0">
               <a:ln>
                 <a:noFill/>
               </a:ln>
@@ -13662,7 +13752,7 @@
               <a:defRPr/>
             </a:pPr>
             <a:r>
-              <a:rPr kumimoji="0" lang="en-US" sz="1600" b="0" i="0" u="none" strike="noStrike" kern="1200" cap="none" spc="0" normalizeH="0" baseline="0" noProof="0" dirty="0" err="1">
+              <a:rPr kumimoji="0" lang="en-US" sz="1800" b="0" i="0" u="none" strike="noStrike" kern="1200" cap="none" spc="0" normalizeH="0" baseline="0" noProof="0" dirty="0" err="1">
                 <a:ln>
                   <a:noFill/>
                 </a:ln>
@@ -13679,7 +13769,7 @@
               <a:t>getRealGraph</a:t>
             </a:r>
             <a:r>
-              <a:rPr kumimoji="0" lang="en-US" sz="1600" b="0" i="0" u="none" strike="noStrike" kern="1200" cap="none" spc="0" normalizeH="0" baseline="0" noProof="0" dirty="0">
+              <a:rPr kumimoji="0" lang="en-US" sz="1800" b="0" i="0" u="none" strike="noStrike" kern="1200" cap="none" spc="0" normalizeH="0" baseline="0" noProof="0" dirty="0">
                 <a:ln>
                   <a:noFill/>
                 </a:ln>
@@ -13696,7 +13786,7 @@
               <a:t> </a:t>
             </a:r>
             <a:r>
-              <a:rPr kumimoji="0" lang="en-US" sz="1600" b="0" i="0" u="none" strike="noStrike" kern="1200" cap="none" spc="0" normalizeH="0" baseline="0" noProof="0" dirty="0">
+              <a:rPr kumimoji="0" lang="en-US" sz="1800" b="0" i="0" u="none" strike="noStrike" kern="1200" cap="none" spc="0" normalizeH="0" baseline="0" noProof="0" dirty="0">
                 <a:ln>
                   <a:noFill/>
                 </a:ln>
@@ -13713,7 +13803,7 @@
               <a:t>– Returns the Boolean </a:t>
             </a:r>
             <a:r>
-              <a:rPr kumimoji="0" lang="en-US" sz="1600" b="0" i="0" u="none" strike="noStrike" kern="1200" cap="none" spc="0" normalizeH="0" baseline="0" noProof="0" dirty="0" err="1">
+              <a:rPr kumimoji="0" lang="en-US" sz="1800" b="0" i="0" u="none" strike="noStrike" kern="1200" cap="none" spc="0" normalizeH="0" baseline="0" noProof="0" dirty="0" err="1">
                 <a:ln>
                   <a:noFill/>
                 </a:ln>
@@ -13729,7 +13819,7 @@
               </a:rPr>
               <a:t>realGraph</a:t>
             </a:r>
-            <a:endParaRPr kumimoji="0" lang="en-US" sz="1600" b="0" i="0" u="none" strike="noStrike" kern="1200" cap="none" spc="0" normalizeH="0" baseline="0" noProof="0" dirty="0">
+            <a:endParaRPr kumimoji="0" lang="en-US" sz="1800" b="0" i="0" u="none" strike="noStrike" kern="1200" cap="none" spc="0" normalizeH="0" baseline="0" noProof="0" dirty="0">
               <a:ln>
                 <a:noFill/>
               </a:ln>
@@ -13763,7 +13853,7 @@
               <a:defRPr/>
             </a:pPr>
             <a:r>
-              <a:rPr kumimoji="0" lang="en-US" sz="1600" b="0" i="0" u="none" strike="noStrike" kern="1200" cap="none" spc="0" normalizeH="0" baseline="0" noProof="0" dirty="0" err="1">
+              <a:rPr kumimoji="0" lang="en-US" sz="1800" b="0" i="0" u="none" strike="noStrike" kern="1200" cap="none" spc="0" normalizeH="0" baseline="0" noProof="0" dirty="0" err="1">
                 <a:ln>
                   <a:noFill/>
                 </a:ln>
@@ -13780,7 +13870,7 @@
               <a:t>getExtraGraph</a:t>
             </a:r>
             <a:r>
-              <a:rPr kumimoji="0" lang="en-US" sz="1600" b="0" i="0" u="none" strike="noStrike" kern="1200" cap="none" spc="0" normalizeH="0" baseline="0" noProof="0" dirty="0">
+              <a:rPr kumimoji="0" lang="en-US" sz="1800" b="0" i="0" u="none" strike="noStrike" kern="1200" cap="none" spc="0" normalizeH="0" baseline="0" noProof="0" dirty="0">
                 <a:ln>
                   <a:noFill/>
                 </a:ln>
@@ -13797,7 +13887,7 @@
               <a:t> </a:t>
             </a:r>
             <a:r>
-              <a:rPr kumimoji="0" lang="en-US" sz="1600" b="0" i="0" u="none" strike="noStrike" kern="1200" cap="none" spc="0" normalizeH="0" baseline="0" noProof="0" dirty="0">
+              <a:rPr kumimoji="0" lang="en-US" sz="1800" b="0" i="0" u="none" strike="noStrike" kern="1200" cap="none" spc="0" normalizeH="0" baseline="0" noProof="0" dirty="0">
                 <a:ln>
                   <a:noFill/>
                 </a:ln>
@@ -13814,7 +13904,7 @@
               <a:t>– Returns the Boolean </a:t>
             </a:r>
             <a:r>
-              <a:rPr kumimoji="0" lang="en-US" sz="1600" b="0" i="0" u="none" strike="noStrike" kern="1200" cap="none" spc="0" normalizeH="0" baseline="0" noProof="0" dirty="0" err="1">
+              <a:rPr kumimoji="0" lang="en-US" sz="1800" b="0" i="0" u="none" strike="noStrike" kern="1200" cap="none" spc="0" normalizeH="0" baseline="0" noProof="0" dirty="0" err="1">
                 <a:ln>
                   <a:noFill/>
                 </a:ln>
@@ -13830,7 +13920,7 @@
               </a:rPr>
               <a:t>extraGraph</a:t>
             </a:r>
-            <a:endParaRPr kumimoji="0" lang="en-US" sz="1600" b="0" i="0" u="none" strike="noStrike" kern="1200" cap="none" spc="0" normalizeH="0" baseline="0" noProof="0" dirty="0">
+            <a:endParaRPr kumimoji="0" lang="en-US" sz="1800" b="0" i="0" u="none" strike="noStrike" kern="1200" cap="none" spc="0" normalizeH="0" baseline="0" noProof="0" dirty="0">
               <a:ln>
                 <a:noFill/>
               </a:ln>
@@ -13864,7 +13954,7 @@
               <a:defRPr/>
             </a:pPr>
             <a:r>
-              <a:rPr kumimoji="0" lang="en-US" sz="1600" b="0" i="0" u="none" strike="noStrike" kern="1200" cap="none" spc="0" normalizeH="0" baseline="0" noProof="0" dirty="0" err="1">
+              <a:rPr kumimoji="0" lang="en-US" sz="1800" b="0" i="0" u="none" strike="noStrike" kern="1200" cap="none" spc="0" normalizeH="0" baseline="0" noProof="0" dirty="0" err="1">
                 <a:ln>
                   <a:noFill/>
                 </a:ln>
@@ -13881,7 +13971,7 @@
               <a:t>getHasName</a:t>
             </a:r>
             <a:r>
-              <a:rPr kumimoji="0" lang="en-US" sz="1600" b="0" i="0" u="none" strike="noStrike" kern="1200" cap="none" spc="0" normalizeH="0" baseline="0" noProof="0" dirty="0">
+              <a:rPr kumimoji="0" lang="en-US" sz="1800" b="0" i="0" u="none" strike="noStrike" kern="1200" cap="none" spc="0" normalizeH="0" baseline="0" noProof="0" dirty="0">
                 <a:ln>
                   <a:noFill/>
                 </a:ln>
@@ -13898,7 +13988,7 @@
               <a:t> </a:t>
             </a:r>
             <a:r>
-              <a:rPr kumimoji="0" lang="en-US" sz="1600" b="0" i="0" u="none" strike="noStrike" kern="1200" cap="none" spc="0" normalizeH="0" baseline="0" noProof="0" dirty="0">
+              <a:rPr kumimoji="0" lang="en-US" sz="1800" b="0" i="0" u="none" strike="noStrike" kern="1200" cap="none" spc="0" normalizeH="0" baseline="0" noProof="0" dirty="0">
                 <a:ln>
                   <a:noFill/>
                 </a:ln>
@@ -13915,7 +14005,7 @@
               <a:t>– Returns the Boolean </a:t>
             </a:r>
             <a:r>
-              <a:rPr kumimoji="0" lang="en-US" sz="1600" b="0" i="0" u="none" strike="noStrike" kern="1200" cap="none" spc="0" normalizeH="0" baseline="0" noProof="0" dirty="0" err="1">
+              <a:rPr kumimoji="0" lang="en-US" sz="1800" b="0" i="0" u="none" strike="noStrike" kern="1200" cap="none" spc="0" normalizeH="0" baseline="0" noProof="0" dirty="0" err="1">
                 <a:ln>
                   <a:noFill/>
                 </a:ln>
@@ -13931,7 +14021,7 @@
               </a:rPr>
               <a:t>hasName</a:t>
             </a:r>
-            <a:endParaRPr kumimoji="0" lang="en-US" sz="1600" b="0" i="0" u="none" strike="noStrike" kern="1200" cap="none" spc="0" normalizeH="0" baseline="0" noProof="0" dirty="0">
+            <a:endParaRPr kumimoji="0" lang="en-US" sz="1800" b="0" i="0" u="none" strike="noStrike" kern="1200" cap="none" spc="0" normalizeH="0" baseline="0" noProof="0" dirty="0">
               <a:ln>
                 <a:noFill/>
               </a:ln>
@@ -14378,7 +14468,7 @@
                 <a:effectLst/>
                 <a:latin typeface="JetBrains Mono"/>
               </a:rPr>
-              <a:t>computeTourLength</a:t>
+              <a:t>getTourDistance</a:t>
             </a:r>
             <a:r>
               <a:rPr lang="pt-PT" sz="1600" dirty="0">
@@ -14402,9 +14492,48 @@
                 <a:effectLst/>
                 <a:latin typeface="JetBrains Mono"/>
               </a:rPr>
-              <a:t>Returns the calculated distance travelled in the cycle provided</a:t>
-            </a:r>
-            <a:endParaRPr lang="pt-PT" sz="1600" dirty="0">
+              <a:t>Returns the total distance travelled in the cycle provided for the real graphs</a:t>
+            </a:r>
+          </a:p>
+          <a:p>
+            <a:r>
+              <a:rPr lang="pt-PT" sz="1600" dirty="0" err="1">
+                <a:solidFill>
+                  <a:srgbClr val="FFC66D"/>
+                </a:solidFill>
+                <a:effectLst/>
+                <a:latin typeface="JetBrains Mono"/>
+              </a:rPr>
+              <a:t>toyAndExtraComputeDistance</a:t>
+            </a:r>
+            <a:r>
+              <a:rPr lang="pt-PT" sz="1600" dirty="0">
+                <a:solidFill>
+                  <a:srgbClr val="FFC66D"/>
+                </a:solidFill>
+                <a:effectLst/>
+                <a:latin typeface="JetBrains Mono"/>
+              </a:rPr>
+              <a:t> </a:t>
+            </a:r>
+            <a:r>
+              <a:rPr lang="pt-PT" sz="1600" dirty="0">
+                <a:effectLst/>
+                <a:latin typeface="JetBrains Mono"/>
+              </a:rPr>
+              <a:t>– </a:t>
+            </a:r>
+            <a:r>
+              <a:rPr lang="en-GB" sz="1600" dirty="0">
+                <a:effectLst/>
+                <a:latin typeface="JetBrains Mono"/>
+              </a:rPr>
+              <a:t>Returns the total distance travelled in the cycle provided for the other graphs</a:t>
+            </a:r>
+            <a:endParaRPr lang="pt-PT" sz="1200" dirty="0">
+              <a:solidFill>
+                <a:srgbClr val="A9B7C6"/>
+              </a:solidFill>
               <a:effectLst/>
               <a:latin typeface="JetBrains Mono"/>
             </a:endParaRPr>
@@ -14531,7 +14660,7 @@
               <a:defRPr/>
             </a:pPr>
             <a:r>
-              <a:rPr kumimoji="0" lang="en-GB" sz="2000" b="0" i="0" u="none" strike="noStrike" kern="1200" cap="none" spc="0" normalizeH="0" baseline="0" noProof="0" dirty="0" err="1">
+              <a:rPr kumimoji="0" lang="en-GB" b="0" i="0" u="none" strike="noStrike" kern="1200" cap="none" spc="0" normalizeH="0" baseline="0" noProof="0" dirty="0" err="1">
                 <a:ln>
                   <a:noFill/>
                 </a:ln>
@@ -14548,7 +14677,7 @@
               <a:t>Graph.h</a:t>
             </a:r>
             <a:r>
-              <a:rPr kumimoji="0" lang="en-GB" sz="2000" b="0" i="0" u="none" strike="noStrike" kern="1200" cap="none" spc="0" normalizeH="0" baseline="0" noProof="0" dirty="0">
+              <a:rPr kumimoji="0" lang="en-GB" b="0" i="0" u="none" strike="noStrike" kern="1200" cap="none" spc="0" normalizeH="0" baseline="0" noProof="0" dirty="0">
                 <a:ln>
                   <a:noFill/>
                 </a:ln>
@@ -14584,7 +14713,7 @@
               <a:defRPr/>
             </a:pPr>
             <a:r>
-              <a:rPr lang="en-GB" sz="1600" dirty="0">
+              <a:rPr lang="en-GB" sz="1800" dirty="0">
                 <a:solidFill>
                   <a:prstClr val="white"/>
                 </a:solidFill>
@@ -14598,7 +14727,7 @@
               <a:defRPr/>
             </a:pPr>
             <a:r>
-              <a:rPr lang="en-GB" sz="1600" dirty="0" err="1">
+              <a:rPr lang="en-GB" sz="1800" dirty="0" err="1">
                 <a:solidFill>
                   <a:srgbClr val="FFC66D"/>
                 </a:solidFill>
@@ -14608,7 +14737,7 @@
               <a:t>hamiltonianCycle</a:t>
             </a:r>
             <a:r>
-              <a:rPr lang="en-GB" sz="1600" dirty="0">
+              <a:rPr lang="en-GB" sz="1800" dirty="0">
                 <a:solidFill>
                   <a:srgbClr val="FFC66D"/>
                 </a:solidFill>
@@ -14618,14 +14747,14 @@
               <a:t> </a:t>
             </a:r>
             <a:r>
-              <a:rPr lang="en-GB" sz="1600" dirty="0">
+              <a:rPr lang="en-GB" sz="1800" dirty="0">
                 <a:effectLst/>
                 <a:latin typeface="JetBrains Mono"/>
               </a:rPr>
               <a:t>– Calls the </a:t>
             </a:r>
             <a:r>
-              <a:rPr lang="en-GB" sz="1600" dirty="0" err="1">
+              <a:rPr lang="en-GB" sz="1800" dirty="0" err="1">
                 <a:solidFill>
                   <a:srgbClr val="FFC66D"/>
                 </a:solidFill>
@@ -14635,7 +14764,7 @@
               <a:t>hamiltonianCycleUtil</a:t>
             </a:r>
             <a:r>
-              <a:rPr lang="en-GB" sz="1600" dirty="0">
+              <a:rPr lang="en-GB" sz="1800" dirty="0">
                 <a:solidFill>
                   <a:srgbClr val="FFC66D"/>
                 </a:solidFill>
@@ -14645,19 +14774,19 @@
               <a:t> </a:t>
             </a:r>
             <a:r>
-              <a:rPr lang="en-GB" sz="1600" dirty="0">
+              <a:rPr lang="en-GB" sz="1800" dirty="0">
                 <a:effectLst/>
                 <a:latin typeface="JetBrains Mono"/>
               </a:rPr>
               <a:t>funct</a:t>
             </a:r>
             <a:r>
-              <a:rPr lang="en-GB" sz="1600" dirty="0">
+              <a:rPr lang="en-GB" sz="1800" dirty="0">
                 <a:latin typeface="JetBrains Mono"/>
               </a:rPr>
               <a:t>ion after initializing the needed variables</a:t>
             </a:r>
-            <a:endParaRPr lang="en-GB" sz="1600" dirty="0">
+            <a:endParaRPr lang="en-GB" sz="1800" dirty="0">
               <a:effectLst/>
               <a:latin typeface="JetBrains Mono"/>
             </a:endParaRPr>
@@ -14667,7 +14796,7 @@
               <a:defRPr/>
             </a:pPr>
             <a:r>
-              <a:rPr lang="en-GB" sz="1600" dirty="0" err="1">
+              <a:rPr lang="en-GB" sz="1800" dirty="0" err="1">
                 <a:solidFill>
                   <a:srgbClr val="FFC66D"/>
                 </a:solidFill>
@@ -14677,7 +14806,7 @@
               <a:t>hamiltonianCycleUtil</a:t>
             </a:r>
             <a:r>
-              <a:rPr lang="en-GB" sz="1600" dirty="0">
+              <a:rPr lang="en-GB" sz="1800" dirty="0">
                 <a:solidFill>
                   <a:srgbClr val="FFC66D"/>
                 </a:solidFill>
@@ -14687,13 +14816,13 @@
               <a:t> </a:t>
             </a:r>
             <a:r>
-              <a:rPr lang="en-GB" sz="1600" dirty="0">
+              <a:rPr lang="en-GB" sz="1800" dirty="0">
                 <a:effectLst/>
                 <a:latin typeface="JetBrains Mono"/>
               </a:rPr>
               <a:t>– Backtracking approach to the TSP problem</a:t>
             </a:r>
-            <a:endParaRPr lang="en-GB" sz="1600" dirty="0">
+            <a:endParaRPr lang="en-GB" sz="1800" dirty="0">
               <a:latin typeface="JetBrains Mono"/>
             </a:endParaRPr>
           </a:p>
@@ -14702,17 +14831,17 @@
               <a:defRPr/>
             </a:pPr>
             <a:r>
-              <a:rPr lang="en-GB" sz="1600" dirty="0" err="1">
+              <a:rPr lang="pt-PT" sz="1800" dirty="0" err="1">
                 <a:solidFill>
                   <a:srgbClr val="FFC66D"/>
                 </a:solidFill>
                 <a:effectLst/>
                 <a:latin typeface="JetBrains Mono"/>
               </a:rPr>
-              <a:t>triangularAproximationHeur</a:t>
-            </a:r>
-            <a:r>
-              <a:rPr lang="en-GB" sz="1600" dirty="0">
+              <a:t>triangularApproximationHeur</a:t>
+            </a:r>
+            <a:r>
+              <a:rPr lang="en-GB" sz="1800" dirty="0">
                 <a:solidFill>
                   <a:srgbClr val="FFC66D"/>
                 </a:solidFill>
@@ -14722,7 +14851,7 @@
               <a:t> </a:t>
             </a:r>
             <a:r>
-              <a:rPr lang="en-GB" sz="1600" dirty="0">
+              <a:rPr lang="en-GB" sz="1800" dirty="0">
                 <a:effectLst/>
                 <a:latin typeface="JetBrains Mono"/>
               </a:rPr>
@@ -14734,17 +14863,17 @@
               <a:defRPr/>
             </a:pPr>
             <a:r>
-              <a:rPr lang="en-GB" sz="1600" dirty="0" err="1">
+              <a:rPr lang="en-GB" sz="1800" dirty="0" err="1">
                 <a:solidFill>
                   <a:srgbClr val="FFC66D"/>
                 </a:solidFill>
                 <a:effectLst/>
                 <a:latin typeface="JetBrains Mono"/>
               </a:rPr>
-              <a:t>triangularAproximationHeurToy</a:t>
-            </a:r>
-            <a:r>
-              <a:rPr lang="en-GB" sz="1600" dirty="0">
+              <a:t>triangularApproximationHeurToy</a:t>
+            </a:r>
+            <a:r>
+              <a:rPr lang="en-GB" sz="1800" dirty="0">
                 <a:solidFill>
                   <a:srgbClr val="FFC66D"/>
                 </a:solidFill>
@@ -14754,13 +14883,13 @@
               <a:t> </a:t>
             </a:r>
             <a:r>
-              <a:rPr lang="en-GB" sz="1600" dirty="0">
+              <a:rPr lang="en-GB" sz="1800" dirty="0">
                 <a:effectLst/>
                 <a:latin typeface="JetBrains Mono"/>
               </a:rPr>
               <a:t>– Triangular Approximation approach to the TSP problem for the Toy graphs</a:t>
             </a:r>
-            <a:endParaRPr lang="en-GB" sz="1600" dirty="0">
+            <a:endParaRPr lang="en-GB" sz="1800" dirty="0">
               <a:latin typeface="JetBrains Mono"/>
             </a:endParaRPr>
           </a:p>
@@ -14769,7 +14898,7 @@
               <a:defRPr/>
             </a:pPr>
             <a:r>
-              <a:rPr lang="en-GB" sz="1600" dirty="0" err="1">
+              <a:rPr lang="en-GB" sz="1800" dirty="0" err="1">
                 <a:solidFill>
                   <a:srgbClr val="FFC66D"/>
                 </a:solidFill>
@@ -14779,7 +14908,7 @@
               <a:t>sosACO</a:t>
             </a:r>
             <a:r>
-              <a:rPr lang="en-GB" sz="1600" dirty="0">
+              <a:rPr lang="en-GB" sz="1800" dirty="0">
                 <a:solidFill>
                   <a:srgbClr val="FFC66D"/>
                 </a:solidFill>
@@ -14789,35 +14918,83 @@
               <a:t> </a:t>
             </a:r>
             <a:r>
-              <a:rPr lang="en-GB" sz="1600" dirty="0">
+              <a:rPr lang="en-GB" sz="1800" dirty="0">
                 <a:effectLst/>
                 <a:latin typeface="JetBrains Mono"/>
               </a:rPr>
               <a:t>– </a:t>
             </a:r>
-          </a:p>
-          <a:p>
-            <a:pPr marL="228600" marR="0" lvl="0" indent="-228600" algn="l" defTabSz="914400" rtl="0" eaLnBrk="1" fontAlgn="auto" latinLnBrk="0" hangingPunct="1">
-              <a:lnSpc>
-                <a:spcPct val="120000"/>
-              </a:lnSpc>
-              <a:spcBef>
-                <a:spcPts val="1000"/>
-              </a:spcBef>
-              <a:spcAft>
-                <a:spcPts val="0"/>
-              </a:spcAft>
-              <a:buClrTx/>
-              <a:buSzPct val="125000"/>
-              <a:buFont typeface="Arial" panose="020B0604020202020204" pitchFamily="34" charset="0"/>
-              <a:buChar char="•"/>
-              <a:tabLst/>
+            <a:r>
+              <a:rPr lang="en-US" sz="1800" dirty="0">
+                <a:effectLst/>
+                <a:latin typeface="JetBrains Mono"/>
+              </a:rPr>
+              <a:t>Self-Organizing System based Ant Colony Optimization </a:t>
+            </a:r>
+            <a:r>
+              <a:rPr lang="en-GB" sz="1800" dirty="0">
+                <a:effectLst/>
+                <a:latin typeface="JetBrains Mono"/>
+              </a:rPr>
+              <a:t>approach</a:t>
+            </a:r>
+            <a:r>
+              <a:rPr lang="en-US" sz="1800" dirty="0">
+                <a:effectLst/>
+                <a:latin typeface="JetBrains Mono"/>
+              </a:rPr>
+              <a:t> to the TSP</a:t>
+            </a:r>
+            <a:endParaRPr lang="en-GB" dirty="0">
+              <a:effectLst/>
+              <a:latin typeface="JetBrains Mono"/>
+            </a:endParaRPr>
+          </a:p>
+          <a:p>
+            <a:pPr>
               <a:defRPr/>
             </a:pPr>
+            <a:r>
+              <a:rPr lang="pt-PT" sz="1800" dirty="0" err="1">
+                <a:solidFill>
+                  <a:srgbClr val="FFC66D"/>
+                </a:solidFill>
+                <a:effectLst/>
+                <a:latin typeface="JetBrains Mono"/>
+              </a:rPr>
+              <a:t>primMST</a:t>
+            </a:r>
+            <a:r>
+              <a:rPr lang="pt-PT" sz="1600" dirty="0">
+                <a:solidFill>
+                  <a:srgbClr val="FFC66D"/>
+                </a:solidFill>
+                <a:effectLst/>
+                <a:latin typeface="JetBrains Mono"/>
+              </a:rPr>
+              <a:t> </a:t>
+            </a:r>
+            <a:r>
+              <a:rPr lang="pt-PT" sz="1600" dirty="0">
+                <a:effectLst/>
+                <a:latin typeface="JetBrains Mono"/>
+              </a:rPr>
+              <a:t>– </a:t>
+            </a:r>
+            <a:r>
+              <a:rPr lang="en-US" sz="1800" dirty="0">
+                <a:latin typeface="JetBrains Mono"/>
+              </a:rPr>
+              <a:t>F</a:t>
+            </a:r>
+            <a:r>
+              <a:rPr lang="en-US" sz="1800" dirty="0">
+                <a:effectLst/>
+                <a:latin typeface="JetBrains Mono"/>
+              </a:rPr>
+              <a:t>inds the minimum spanning tree of a graph using Prim's algorithm</a:t>
+            </a:r>
             <a:endParaRPr lang="en-GB" sz="1600" dirty="0">
-              <a:solidFill>
-                <a:prstClr val="white"/>
-              </a:solidFill>
               <a:latin typeface="Tw Cen MT" panose="020B0602020104020603"/>
             </a:endParaRPr>
           </a:p>
@@ -14973,8 +15150,20 @@
           <a:p>
             <a:pPr lvl="2"/>
             <a:r>
+              <a:rPr lang="en-GB" sz="2000"/>
+              <a:t>Reasonably fast </a:t>
+            </a:r>
+            <a:r>
               <a:rPr lang="en-GB" sz="2000" dirty="0"/>
-              <a:t>Fast algorithms with good results</a:t>
+              <a:t>algorithms with good-</a:t>
+            </a:r>
+            <a:r>
+              <a:rPr lang="en-GB" sz="2000" dirty="0" err="1"/>
+              <a:t>ish</a:t>
+            </a:r>
+            <a:r>
+              <a:rPr lang="en-GB" sz="2000" dirty="0"/>
+              <a:t> results</a:t>
             </a:r>
           </a:p>
         </p:txBody>
@@ -15247,18 +15436,18 @@
 </file>
 
 <file path=customXml/item1.xml><?xml version="1.0" encoding="utf-8"?>
+<p:properties xmlns:p="http://schemas.microsoft.com/office/2006/metadata/properties" xmlns:xsi="http://www.w3.org/2001/XMLSchema-instance" xmlns:pc="http://schemas.microsoft.com/office/infopath/2007/PartnerControls">
+  <documentManagement/>
+</p:properties>
+</file>
+
+<file path=customXml/item2.xml><?xml version="1.0" encoding="utf-8"?>
 <?mso-contentType ?>
 <FormTemplates xmlns="http://schemas.microsoft.com/sharepoint/v3/contenttype/forms">
   <Display>DocumentLibraryForm</Display>
   <Edit>DocumentLibraryForm</Edit>
   <New>DocumentLibraryForm</New>
 </FormTemplates>
-</file>
-
-<file path=customXml/item2.xml><?xml version="1.0" encoding="utf-8"?>
-<p:properties xmlns:p="http://schemas.microsoft.com/office/2006/metadata/properties" xmlns:xsi="http://www.w3.org/2001/XMLSchema-instance" xmlns:pc="http://schemas.microsoft.com/office/infopath/2007/PartnerControls">
-  <documentManagement/>
-</p:properties>
 </file>
 
 <file path=customXml/item3.xml><?xml version="1.0" encoding="utf-8"?>
@@ -15376,14 +15565,6 @@
 </file>
 
 <file path=customXml/itemProps1.xml><?xml version="1.0" encoding="utf-8"?>
-<ds:datastoreItem xmlns:ds="http://schemas.openxmlformats.org/officeDocument/2006/customXml" ds:itemID="{D51E79FD-84A2-4D99-AE38-6BF45A3426BF}">
-  <ds:schemaRefs>
-    <ds:schemaRef ds:uri="http://schemas.microsoft.com/sharepoint/v3/contenttype/forms"/>
-  </ds:schemaRefs>
-</ds:datastoreItem>
-</file>
-
-<file path=customXml/itemProps2.xml><?xml version="1.0" encoding="utf-8"?>
 <ds:datastoreItem xmlns:ds="http://schemas.openxmlformats.org/officeDocument/2006/customXml" ds:itemID="{30F54BB1-1701-417A-9430-1DDD3233E544}">
   <ds:schemaRefs>
     <ds:schemaRef ds:uri="http://schemas.microsoft.com/office/2006/documentManagement/types"/>
@@ -15394,6 +15575,14 @@
     <ds:schemaRef ds:uri="http://purl.org/dc/terms/"/>
     <ds:schemaRef ds:uri="http://www.w3.org/XML/1998/namespace"/>
     <ds:schemaRef ds:uri="http://purl.org/dc/dcmitype/"/>
+  </ds:schemaRefs>
+</ds:datastoreItem>
+</file>
+
+<file path=customXml/itemProps2.xml><?xml version="1.0" encoding="utf-8"?>
+<ds:datastoreItem xmlns:ds="http://schemas.openxmlformats.org/officeDocument/2006/customXml" ds:itemID="{D51E79FD-84A2-4D99-AE38-6BF45A3426BF}">
+  <ds:schemaRefs>
+    <ds:schemaRef ds:uri="http://schemas.microsoft.com/sharepoint/v3/contenttype/forms"/>
   </ds:schemaRefs>
 </ds:datastoreItem>
 </file>

</xml_diff>